<commit_message>
Some MC6 Pro updates
</commit_message>
<xml_diff>
--- a/MC8.pptx
+++ b/MC8.pptx
@@ -252,7 +252,7 @@
           <a:p>
             <a:fld id="{95339B3D-D54B-4A71-BAD3-52665AB11A2C}" type="datetimeFigureOut">
               <a:rPr lang="en-US" smtClean="0"/>
-              <a:t>2/25/2023</a:t>
+              <a:t>2/26/2023</a:t>
             </a:fld>
             <a:endParaRPr lang="en-US"/>
           </a:p>
@@ -422,7 +422,7 @@
           <a:p>
             <a:fld id="{95339B3D-D54B-4A71-BAD3-52665AB11A2C}" type="datetimeFigureOut">
               <a:rPr lang="en-US" smtClean="0"/>
-              <a:t>2/25/2023</a:t>
+              <a:t>2/26/2023</a:t>
             </a:fld>
             <a:endParaRPr lang="en-US"/>
           </a:p>
@@ -602,7 +602,7 @@
           <a:p>
             <a:fld id="{95339B3D-D54B-4A71-BAD3-52665AB11A2C}" type="datetimeFigureOut">
               <a:rPr lang="en-US" smtClean="0"/>
-              <a:t>2/25/2023</a:t>
+              <a:t>2/26/2023</a:t>
             </a:fld>
             <a:endParaRPr lang="en-US"/>
           </a:p>
@@ -772,7 +772,7 @@
           <a:p>
             <a:fld id="{95339B3D-D54B-4A71-BAD3-52665AB11A2C}" type="datetimeFigureOut">
               <a:rPr lang="en-US" smtClean="0"/>
-              <a:t>2/25/2023</a:t>
+              <a:t>2/26/2023</a:t>
             </a:fld>
             <a:endParaRPr lang="en-US"/>
           </a:p>
@@ -1016,7 +1016,7 @@
           <a:p>
             <a:fld id="{95339B3D-D54B-4A71-BAD3-52665AB11A2C}" type="datetimeFigureOut">
               <a:rPr lang="en-US" smtClean="0"/>
-              <a:t>2/25/2023</a:t>
+              <a:t>2/26/2023</a:t>
             </a:fld>
             <a:endParaRPr lang="en-US"/>
           </a:p>
@@ -1248,7 +1248,7 @@
           <a:p>
             <a:fld id="{95339B3D-D54B-4A71-BAD3-52665AB11A2C}" type="datetimeFigureOut">
               <a:rPr lang="en-US" smtClean="0"/>
-              <a:t>2/25/2023</a:t>
+              <a:t>2/26/2023</a:t>
             </a:fld>
             <a:endParaRPr lang="en-US"/>
           </a:p>
@@ -1615,7 +1615,7 @@
           <a:p>
             <a:fld id="{95339B3D-D54B-4A71-BAD3-52665AB11A2C}" type="datetimeFigureOut">
               <a:rPr lang="en-US" smtClean="0"/>
-              <a:t>2/25/2023</a:t>
+              <a:t>2/26/2023</a:t>
             </a:fld>
             <a:endParaRPr lang="en-US"/>
           </a:p>
@@ -1733,7 +1733,7 @@
           <a:p>
             <a:fld id="{95339B3D-D54B-4A71-BAD3-52665AB11A2C}" type="datetimeFigureOut">
               <a:rPr lang="en-US" smtClean="0"/>
-              <a:t>2/25/2023</a:t>
+              <a:t>2/26/2023</a:t>
             </a:fld>
             <a:endParaRPr lang="en-US"/>
           </a:p>
@@ -1828,7 +1828,7 @@
           <a:p>
             <a:fld id="{95339B3D-D54B-4A71-BAD3-52665AB11A2C}" type="datetimeFigureOut">
               <a:rPr lang="en-US" smtClean="0"/>
-              <a:t>2/25/2023</a:t>
+              <a:t>2/26/2023</a:t>
             </a:fld>
             <a:endParaRPr lang="en-US"/>
           </a:p>
@@ -2105,7 +2105,7 @@
           <a:p>
             <a:fld id="{95339B3D-D54B-4A71-BAD3-52665AB11A2C}" type="datetimeFigureOut">
               <a:rPr lang="en-US" smtClean="0"/>
-              <a:t>2/25/2023</a:t>
+              <a:t>2/26/2023</a:t>
             </a:fld>
             <a:endParaRPr lang="en-US"/>
           </a:p>
@@ -2362,7 +2362,7 @@
           <a:p>
             <a:fld id="{95339B3D-D54B-4A71-BAD3-52665AB11A2C}" type="datetimeFigureOut">
               <a:rPr lang="en-US" smtClean="0"/>
-              <a:t>2/25/2023</a:t>
+              <a:t>2/26/2023</a:t>
             </a:fld>
             <a:endParaRPr lang="en-US"/>
           </a:p>
@@ -2575,7 +2575,7 @@
           <a:p>
             <a:fld id="{95339B3D-D54B-4A71-BAD3-52665AB11A2C}" type="datetimeFigureOut">
               <a:rPr lang="en-US" smtClean="0"/>
-              <a:t>2/25/2023</a:t>
+              <a:t>2/26/2023</a:t>
             </a:fld>
             <a:endParaRPr lang="en-US"/>
           </a:p>
@@ -3042,7 +3042,7 @@
         <p:spPr>
           <a:xfrm>
             <a:off x="1963910" y="154464"/>
-            <a:ext cx="4589333" cy="369332"/>
+            <a:ext cx="5129546" cy="369332"/>
           </a:xfrm>
           <a:prstGeom prst="rect">
             <a:avLst/>
@@ -3057,7 +3057,7 @@
           <a:p>
             <a:r>
               <a:rPr lang="en-US" b="1" dirty="0"/>
-              <a:t>The Morningstar MC8 </a:t>
+              <a:t>The Morningstar MC8/MC6 </a:t>
             </a:r>
             <a:r>
               <a:rPr lang="en-US" b="1" dirty="0" err="1"/>
@@ -3972,7 +3972,7 @@
         <p:spPr>
           <a:xfrm>
             <a:off x="362992" y="369537"/>
-            <a:ext cx="8095208" cy="5509200"/>
+            <a:ext cx="8095208" cy="5878532"/>
           </a:xfrm>
           <a:prstGeom prst="rect">
             <a:avLst/>
@@ -3987,7 +3987,15 @@
           <a:p>
             <a:r>
               <a:rPr lang="en-US" sz="1400" b="1" dirty="0"/>
-              <a:t>Design Goal of the MC8 Extension</a:t>
+              <a:t>Design Goal of the </a:t>
+            </a:r>
+            <a:r>
+              <a:rPr lang="en-US" sz="1400" b="1" dirty="0" err="1"/>
+              <a:t>MCx</a:t>
+            </a:r>
+            <a:r>
+              <a:rPr lang="en-US" sz="1400" b="1" dirty="0"/>
+              <a:t> Extension</a:t>
             </a:r>
           </a:p>
           <a:p>
@@ -4020,7 +4028,15 @@
             </a:r>
             <a:r>
               <a:rPr lang="en-US" sz="1200" dirty="0"/>
-              <a:t>, Variations, Songs, Setlists, etc.</a:t>
+              <a:t>, Variations, Songs, Setlists, etc.  It has been adapted to work with the MC6 and MC6 Pro.  Collectively we’ll refer to these as </a:t>
+            </a:r>
+            <a:r>
+              <a:rPr lang="en-US" sz="1200" dirty="0" err="1"/>
+              <a:t>MCx</a:t>
+            </a:r>
+            <a:r>
+              <a:rPr lang="en-US" sz="1200" dirty="0"/>
+              <a:t>.</a:t>
             </a:r>
           </a:p>
           <a:p>
@@ -4029,7 +4045,15 @@
           <a:p>
             <a:r>
               <a:rPr lang="en-US" sz="1200" dirty="0"/>
-              <a:t>This extension requires setting one bank on the MC8 to communicate with this </a:t>
+              <a:t>This extension requires setting one bank on the </a:t>
+            </a:r>
+            <a:r>
+              <a:rPr lang="en-US" sz="1200" dirty="0" err="1"/>
+              <a:t>MCx</a:t>
+            </a:r>
+            <a:r>
+              <a:rPr lang="en-US" sz="1200" dirty="0"/>
+              <a:t> to communicate with this </a:t>
             </a:r>
             <a:r>
               <a:rPr lang="en-US" sz="1200" dirty="0" err="1"/>
@@ -4037,7 +4061,7 @@
             </a:r>
             <a:r>
               <a:rPr lang="en-US" sz="1200" dirty="0"/>
-              <a:t> extension.  I use bank 30, but any bank can be used for this purpose.  When controlling </a:t>
+              <a:t> extension.  Any bank can be used for this purpose.  When controlling </a:t>
             </a:r>
             <a:r>
               <a:rPr lang="en-US" sz="1200" dirty="0" err="1"/>
@@ -4045,7 +4069,39 @@
             </a:r>
             <a:r>
               <a:rPr lang="en-US" sz="1200" dirty="0"/>
-              <a:t> with this extension the MC8 will always be operating with that single bank.</a:t>
+              <a:t> with this extension the </a:t>
+            </a:r>
+            <a:r>
+              <a:rPr lang="en-US" sz="1200" dirty="0" err="1"/>
+              <a:t>MCx</a:t>
+            </a:r>
+            <a:r>
+              <a:rPr lang="en-US" sz="1200" dirty="0"/>
+              <a:t> will always be operating with that single bank.  To minimize risk of unintentionally overwriting your other banks, your </a:t>
+            </a:r>
+            <a:r>
+              <a:rPr lang="en-US" sz="1200" dirty="0" err="1"/>
+              <a:t>MCx</a:t>
+            </a:r>
+            <a:r>
+              <a:rPr lang="en-US" sz="1200" dirty="0"/>
+              <a:t> should be set to this </a:t>
+            </a:r>
+            <a:r>
+              <a:rPr lang="en-US" sz="1200" dirty="0" err="1"/>
+              <a:t>GigPerformer</a:t>
+            </a:r>
+            <a:r>
+              <a:rPr lang="en-US" sz="1200" dirty="0"/>
+              <a:t> bank before starting </a:t>
+            </a:r>
+            <a:r>
+              <a:rPr lang="en-US" sz="1200" dirty="0" err="1"/>
+              <a:t>GigPerformer</a:t>
+            </a:r>
+            <a:r>
+              <a:rPr lang="en-US" sz="1200" dirty="0"/>
+              <a:t> using this extension.</a:t>
             </a:r>
           </a:p>
           <a:p>
@@ -4054,7 +4110,15 @@
           <a:p>
             <a:r>
               <a:rPr lang="en-US" sz="1200" dirty="0"/>
-              <a:t>With that bank the user will be able to assign any number of toggle widgets to MC8 foot switches, switch among </a:t>
+              <a:t>With this GP bank the user will be able to assign any number of toggle widgets to </a:t>
+            </a:r>
+            <a:r>
+              <a:rPr lang="en-US" sz="1200" dirty="0" err="1"/>
+              <a:t>MCx</a:t>
+            </a:r>
+            <a:r>
+              <a:rPr lang="en-US" sz="1200" dirty="0"/>
+              <a:t> foot switches, switch among </a:t>
             </a:r>
             <a:r>
               <a:rPr lang="en-US" sz="1200" dirty="0" err="1"/>
@@ -4070,7 +4134,15 @@
             </a:r>
             <a:r>
               <a:rPr lang="en-US" sz="1200" dirty="0"/>
-              <a:t>, and the MC8 display will always reflect which button is controlling what, and what its present state is.</a:t>
+              <a:t>, and the </a:t>
+            </a:r>
+            <a:r>
+              <a:rPr lang="en-US" sz="1200" dirty="0" err="1"/>
+              <a:t>MCx</a:t>
+            </a:r>
+            <a:r>
+              <a:rPr lang="en-US" sz="1200" dirty="0"/>
+              <a:t> display will always reflect which button is controlling what, and what its present state is.</a:t>
             </a:r>
           </a:p>
           <a:p>
@@ -4079,7 +4151,47 @@
           <a:p>
             <a:r>
               <a:rPr lang="en-US" sz="1200" dirty="0"/>
-              <a:t>This extension utilizes the MC8 as a simple button and display interface.   The MC8 will display what the extension tells it to display, and the MC8 will send the same messages whenever a specific button is pressed.  All of the logic for controlling the displays and reacting to foot presses resides in the extension, not in the MC8.  The bank on the MC8 that is used to control </a:t>
+              <a:t>This extension utilizes the </a:t>
+            </a:r>
+            <a:r>
+              <a:rPr lang="en-US" sz="1200" dirty="0" err="1"/>
+              <a:t>MCx</a:t>
+            </a:r>
+            <a:r>
+              <a:rPr lang="en-US" sz="1200" dirty="0"/>
+              <a:t> as a simple button and display device.   The </a:t>
+            </a:r>
+            <a:r>
+              <a:rPr lang="en-US" sz="1200" dirty="0" err="1"/>
+              <a:t>MCx</a:t>
+            </a:r>
+            <a:r>
+              <a:rPr lang="en-US" sz="1200" dirty="0"/>
+              <a:t> will display what the extension tells it to display, and the </a:t>
+            </a:r>
+            <a:r>
+              <a:rPr lang="en-US" sz="1200" dirty="0" err="1"/>
+              <a:t>MCx</a:t>
+            </a:r>
+            <a:r>
+              <a:rPr lang="en-US" sz="1200" dirty="0"/>
+              <a:t> will send the same messages whenever a button is pressed.  All of the logic for controlling the displays and reacting to foot presses resides in the extension, not in the </a:t>
+            </a:r>
+            <a:r>
+              <a:rPr lang="en-US" sz="1200" dirty="0" err="1"/>
+              <a:t>MCx</a:t>
+            </a:r>
+            <a:r>
+              <a:rPr lang="en-US" sz="1200" dirty="0"/>
+              <a:t>.  The bank on the </a:t>
+            </a:r>
+            <a:r>
+              <a:rPr lang="en-US" sz="1200" dirty="0" err="1"/>
+              <a:t>MCx</a:t>
+            </a:r>
+            <a:r>
+              <a:rPr lang="en-US" sz="1200" dirty="0"/>
+              <a:t> that is used to control </a:t>
             </a:r>
             <a:r>
               <a:rPr lang="en-US" sz="1200" dirty="0" err="1"/>
@@ -4096,7 +4208,15 @@
           <a:p>
             <a:r>
               <a:rPr lang="en-US" sz="1200" dirty="0"/>
-              <a:t>This means you can dedicate one “bank” on the MC8 to </a:t>
+              <a:t>This means you can dedicate one “bank” on the </a:t>
+            </a:r>
+            <a:r>
+              <a:rPr lang="en-US" sz="1200" dirty="0" err="1"/>
+              <a:t>MCx</a:t>
+            </a:r>
+            <a:r>
+              <a:rPr lang="en-US" sz="1200" dirty="0"/>
+              <a:t> to </a:t>
             </a:r>
             <a:r>
               <a:rPr lang="en-US" sz="1200" dirty="0" err="1"/>
@@ -4124,7 +4244,15 @@
             </a:r>
             <a:r>
               <a:rPr lang="en-US" sz="1400" b="1" dirty="0"/>
-              <a:t> with the MC8 Extension</a:t>
+              <a:t> with the </a:t>
+            </a:r>
+            <a:r>
+              <a:rPr lang="en-US" sz="1400" b="1" dirty="0" err="1"/>
+              <a:t>MCx</a:t>
+            </a:r>
+            <a:r>
+              <a:rPr lang="en-US" sz="1400" b="1" dirty="0"/>
+              <a:t> Extension</a:t>
             </a:r>
           </a:p>
           <a:p>
@@ -4141,7 +4269,15 @@
             </a:r>
             <a:r>
               <a:rPr lang="en-US" sz="1200" dirty="0"/>
-              <a:t> interacts with the MC8 is done through widgets in </a:t>
+              <a:t> interacts with the </a:t>
+            </a:r>
+            <a:r>
+              <a:rPr lang="en-US" sz="1200" dirty="0" err="1"/>
+              <a:t>MCx</a:t>
+            </a:r>
+            <a:r>
+              <a:rPr lang="en-US" sz="1200" dirty="0"/>
+              <a:t> is done through widgets in </a:t>
             </a:r>
             <a:r>
               <a:rPr lang="en-US" sz="1200" dirty="0" err="1"/>
@@ -4168,7 +4304,15 @@
             </a:pPr>
             <a:r>
               <a:rPr lang="en-US" sz="1200" dirty="0"/>
-              <a:t>Conceptual relationship between the physical displays and buttons on the MC8 and the logical structure of the extension</a:t>
+              <a:t>Conceptual relationship between the physical displays and buttons on the </a:t>
+            </a:r>
+            <a:r>
+              <a:rPr lang="en-US" sz="1200" dirty="0" err="1"/>
+              <a:t>MCx</a:t>
+            </a:r>
+            <a:r>
+              <a:rPr lang="en-US" sz="1200" dirty="0"/>
+              <a:t> and the logical structure of the extension</a:t>
             </a:r>
           </a:p>
           <a:p>
@@ -4222,7 +4366,7 @@
         <p:spPr>
           <a:xfrm>
             <a:off x="362992" y="369537"/>
-            <a:ext cx="8095208" cy="6247864"/>
+            <a:ext cx="8095208" cy="6432530"/>
           </a:xfrm>
           <a:prstGeom prst="rect">
             <a:avLst/>
@@ -4237,7 +4381,15 @@
           <a:p>
             <a:r>
               <a:rPr lang="en-US" sz="1400" b="1" dirty="0"/>
-              <a:t>Overview of the MC8 Extension</a:t>
+              <a:t>Overview of the </a:t>
+            </a:r>
+            <a:r>
+              <a:rPr lang="en-US" sz="1400" b="1" dirty="0" err="1"/>
+              <a:t>MCx</a:t>
+            </a:r>
+            <a:r>
+              <a:rPr lang="en-US" sz="1400" b="1" dirty="0"/>
+              <a:t> Extension</a:t>
             </a:r>
           </a:p>
           <a:p>
@@ -4246,7 +4398,7 @@
           <a:p>
             <a:r>
               <a:rPr lang="en-US" sz="1200" dirty="0"/>
-              <a:t>The Morningstar MC8 can be viewed as a control surface having two rows of four foot switches, and display sections corresponding to those switches.  We will refer to these as the Top row and the Bottom row.</a:t>
+              <a:t>The Morningstar MC8 can be viewed as a control surface having two rows of four foot switches, and display sections corresponding to those switches.  We will refer to these as the Top row and the Bottom row.  On the MC6 there are three buttons per row, not four, but otherwise everything works the same way.</a:t>
             </a:r>
           </a:p>
           <a:p>
@@ -4336,7 +4488,15 @@
             </a:r>
             <a:r>
               <a:rPr lang="en-US" sz="1200" dirty="0"/>
-              <a:t> on the MC8 can be used for expression pedals or additional foot switches (Aux switches).  By default </a:t>
+              <a:t> on the </a:t>
+            </a:r>
+            <a:r>
+              <a:rPr lang="en-US" sz="1200" dirty="0" err="1"/>
+              <a:t>MCx</a:t>
+            </a:r>
+            <a:r>
+              <a:rPr lang="en-US" sz="1200" dirty="0"/>
+              <a:t> can be used for expression pedals or additional foot switches (Aux switches).  The extension looks for extra switches on </a:t>
             </a:r>
             <a:r>
               <a:rPr lang="en-US" sz="1200" dirty="0" err="1"/>
@@ -4344,7 +4504,7 @@
             </a:r>
             <a:r>
               <a:rPr lang="en-US" sz="1200" dirty="0"/>
-              <a:t> 3 and 4 are set up for expression pedals, which can be linked to widgets through this extension.  </a:t>
+              <a:t> 3 and 4 with the MC6 Pro, and </a:t>
             </a:r>
             <a:r>
               <a:rPr lang="en-US" sz="1200" dirty="0" err="1"/>
@@ -4352,7 +4512,15 @@
             </a:r>
             <a:r>
               <a:rPr lang="en-US" sz="1200" dirty="0"/>
-              <a:t> 1 and 2 are set up to accommodate six additional buttons to control paging through what is displayed on the top and bottom rows.</a:t>
+              <a:t> 1 and 2 on the MC8.  The other two </a:t>
+            </a:r>
+            <a:r>
+              <a:rPr lang="en-US" sz="1200" dirty="0" err="1"/>
+              <a:t>Omniports</a:t>
+            </a:r>
+            <a:r>
+              <a:rPr lang="en-US" sz="1200" dirty="0"/>
+              <a:t> can be linked to knob/fader/pedal widgets through this extension.  </a:t>
             </a:r>
           </a:p>
           <a:p>
@@ -5290,6 +5458,42 @@
           </a:p>
         </p:txBody>
       </p:sp>
+      <p:sp>
+        <p:nvSpPr>
+          <p:cNvPr id="2" name="TextBox 1">
+            <a:extLst>
+              <a:ext uri="{FF2B5EF4-FFF2-40B4-BE49-F238E27FC236}">
+                <a16:creationId xmlns:a16="http://schemas.microsoft.com/office/drawing/2014/main" id="{1DC7C3B9-0C03-6188-3CAC-94CCA3C74DB7}"/>
+              </a:ext>
+            </a:extLst>
+          </p:cNvPr>
+          <p:cNvSpPr txBox="1"/>
+          <p:nvPr/>
+        </p:nvSpPr>
+        <p:spPr>
+          <a:xfrm>
+            <a:off x="6966968" y="5890837"/>
+            <a:ext cx="2041474" cy="738664"/>
+          </a:xfrm>
+          <a:prstGeom prst="rect">
+            <a:avLst/>
+          </a:prstGeom>
+          <a:noFill/>
+        </p:spPr>
+        <p:txBody>
+          <a:bodyPr wrap="square" rtlCol="0">
+            <a:spAutoFit/>
+          </a:bodyPr>
+          <a:lstStyle/>
+          <a:p>
+            <a:r>
+              <a:rPr lang="en-US" sz="1400" b="1" i="1" dirty="0"/>
+              <a:t>Note:  on the MC6 Pro the “Page” buttons effectively don’t exist</a:t>
+            </a:r>
+            <a:endParaRPr lang="en-US" sz="1400" i="1" dirty="0"/>
+          </a:p>
+        </p:txBody>
+      </p:sp>
     </p:spTree>
     <p:extLst>
       <p:ext uri="{BB962C8B-B14F-4D97-AF65-F5344CB8AC3E}">
@@ -5901,7 +6105,7 @@
         <p:spPr>
           <a:xfrm>
             <a:off x="362992" y="369537"/>
-            <a:ext cx="8095208" cy="954107"/>
+            <a:ext cx="8095208" cy="1169551"/>
           </a:xfrm>
           <a:prstGeom prst="rect">
             <a:avLst/>
@@ -5924,7 +6128,15 @@
             </a:r>
             <a:r>
               <a:rPr lang="en-US" sz="1400" dirty="0"/>
-              <a:t> 1 and 2.</a:t>
+              <a:t> 1 and 2 set up as Aux.  On the MC6 Pro you must use </a:t>
+            </a:r>
+            <a:r>
+              <a:rPr lang="en-US" sz="1400" dirty="0" err="1"/>
+              <a:t>Omniports</a:t>
+            </a:r>
+            <a:r>
+              <a:rPr lang="en-US" sz="1400" dirty="0"/>
+              <a:t> 3 and 4 set up as Aux switches.</a:t>
             </a:r>
           </a:p>
           <a:p>
@@ -5933,7 +6145,7 @@
           <a:p>
             <a:r>
               <a:rPr lang="en-US" sz="1400" dirty="0"/>
-              <a:t>The diagram below illustrates how these are assigned.  They replicate the Long Press functions without requiring a long press for those of us who believe life is too short for Long Presses.</a:t>
+              <a:t>The diagram below illustrates how these are assigned.  They replicate the Long Press functions without requiring a long press for those of us who feel life is too short for Long Presses.</a:t>
             </a:r>
           </a:p>
         </p:txBody>
@@ -7909,15 +8121,7 @@
             </a:pPr>
             <a:r>
               <a:rPr lang="en-US" sz="1200" dirty="0"/>
-              <a:t>These are </a:t>
-            </a:r>
-            <a:r>
-              <a:rPr lang="en-US" sz="1200" dirty="0" err="1"/>
-              <a:t>usuall</a:t>
-            </a:r>
-            <a:r>
-              <a:rPr lang="en-US" sz="1200" dirty="0"/>
-              <a:t> created as Text widgets.  Because they extension switches the “Value” of these widgets between 0.3 and 1.0 depending on whether they are being shown on the MC8, the apparent brightness of the widgets will change on the GP screen.</a:t>
+              <a:t>These are usually created as Text widgets.  Because the extension switches the “Value” of these widgets between 0.3 and 1.0 depending on whether they are being shown on the MC8, the apparent brightness of the widgets will change on the GP screen.</a:t>
             </a:r>
           </a:p>
           <a:p>
@@ -8204,7 +8408,15 @@
             </a:r>
             <a:r>
               <a:rPr lang="en-US" sz="1200" dirty="0"/>
-              <a:t> widget is present in a Rackspace the MC8 will reflect that configuration upon Rackspace entry</a:t>
+              <a:t> widget is present in a Rackspace the </a:t>
+            </a:r>
+            <a:r>
+              <a:rPr lang="en-US" sz="1200" dirty="0" err="1"/>
+              <a:t>MCx</a:t>
+            </a:r>
+            <a:r>
+              <a:rPr lang="en-US" sz="1200" dirty="0"/>
+              <a:t> will reflect that configuration upon Rackspace entry</a:t>
             </a:r>
           </a:p>
           <a:p>
@@ -8257,7 +8469,7 @@
             </a:r>
             <a:r>
               <a:rPr lang="en-US" sz="1200" dirty="0"/>
-              <a:t> widget exists in the global Rackspace the extension will pick that up upon every Rackspace change</a:t>
+              <a:t> widget exists in the global Rackspace the extension will pick that up on every Rackspace change</a:t>
             </a:r>
           </a:p>
           <a:p>

</xml_diff>

<commit_message>
Fixed some row switching, documentation
</commit_message>
<xml_diff>
--- a/MC8.pptx
+++ b/MC8.pptx
@@ -254,7 +254,7 @@
           <a:p>
             <a:fld id="{95339B3D-D54B-4A71-BAD3-52665AB11A2C}" type="datetimeFigureOut">
               <a:rPr lang="en-US" smtClean="0"/>
-              <a:t>3/8/2023</a:t>
+              <a:t>3/11/2023</a:t>
             </a:fld>
             <a:endParaRPr lang="en-US"/>
           </a:p>
@@ -424,7 +424,7 @@
           <a:p>
             <a:fld id="{95339B3D-D54B-4A71-BAD3-52665AB11A2C}" type="datetimeFigureOut">
               <a:rPr lang="en-US" smtClean="0"/>
-              <a:t>3/8/2023</a:t>
+              <a:t>3/11/2023</a:t>
             </a:fld>
             <a:endParaRPr lang="en-US"/>
           </a:p>
@@ -604,7 +604,7 @@
           <a:p>
             <a:fld id="{95339B3D-D54B-4A71-BAD3-52665AB11A2C}" type="datetimeFigureOut">
               <a:rPr lang="en-US" smtClean="0"/>
-              <a:t>3/8/2023</a:t>
+              <a:t>3/11/2023</a:t>
             </a:fld>
             <a:endParaRPr lang="en-US"/>
           </a:p>
@@ -774,7 +774,7 @@
           <a:p>
             <a:fld id="{95339B3D-D54B-4A71-BAD3-52665AB11A2C}" type="datetimeFigureOut">
               <a:rPr lang="en-US" smtClean="0"/>
-              <a:t>3/8/2023</a:t>
+              <a:t>3/11/2023</a:t>
             </a:fld>
             <a:endParaRPr lang="en-US"/>
           </a:p>
@@ -1018,7 +1018,7 @@
           <a:p>
             <a:fld id="{95339B3D-D54B-4A71-BAD3-52665AB11A2C}" type="datetimeFigureOut">
               <a:rPr lang="en-US" smtClean="0"/>
-              <a:t>3/8/2023</a:t>
+              <a:t>3/11/2023</a:t>
             </a:fld>
             <a:endParaRPr lang="en-US"/>
           </a:p>
@@ -1250,7 +1250,7 @@
           <a:p>
             <a:fld id="{95339B3D-D54B-4A71-BAD3-52665AB11A2C}" type="datetimeFigureOut">
               <a:rPr lang="en-US" smtClean="0"/>
-              <a:t>3/8/2023</a:t>
+              <a:t>3/11/2023</a:t>
             </a:fld>
             <a:endParaRPr lang="en-US"/>
           </a:p>
@@ -1617,7 +1617,7 @@
           <a:p>
             <a:fld id="{95339B3D-D54B-4A71-BAD3-52665AB11A2C}" type="datetimeFigureOut">
               <a:rPr lang="en-US" smtClean="0"/>
-              <a:t>3/8/2023</a:t>
+              <a:t>3/11/2023</a:t>
             </a:fld>
             <a:endParaRPr lang="en-US"/>
           </a:p>
@@ -1735,7 +1735,7 @@
           <a:p>
             <a:fld id="{95339B3D-D54B-4A71-BAD3-52665AB11A2C}" type="datetimeFigureOut">
               <a:rPr lang="en-US" smtClean="0"/>
-              <a:t>3/8/2023</a:t>
+              <a:t>3/11/2023</a:t>
             </a:fld>
             <a:endParaRPr lang="en-US"/>
           </a:p>
@@ -1830,7 +1830,7 @@
           <a:p>
             <a:fld id="{95339B3D-D54B-4A71-BAD3-52665AB11A2C}" type="datetimeFigureOut">
               <a:rPr lang="en-US" smtClean="0"/>
-              <a:t>3/8/2023</a:t>
+              <a:t>3/11/2023</a:t>
             </a:fld>
             <a:endParaRPr lang="en-US"/>
           </a:p>
@@ -2107,7 +2107,7 @@
           <a:p>
             <a:fld id="{95339B3D-D54B-4A71-BAD3-52665AB11A2C}" type="datetimeFigureOut">
               <a:rPr lang="en-US" smtClean="0"/>
-              <a:t>3/8/2023</a:t>
+              <a:t>3/11/2023</a:t>
             </a:fld>
             <a:endParaRPr lang="en-US"/>
           </a:p>
@@ -2364,7 +2364,7 @@
           <a:p>
             <a:fld id="{95339B3D-D54B-4A71-BAD3-52665AB11A2C}" type="datetimeFigureOut">
               <a:rPr lang="en-US" smtClean="0"/>
-              <a:t>3/8/2023</a:t>
+              <a:t>3/11/2023</a:t>
             </a:fld>
             <a:endParaRPr lang="en-US"/>
           </a:p>
@@ -2577,7 +2577,7 @@
           <a:p>
             <a:fld id="{95339B3D-D54B-4A71-BAD3-52665AB11A2C}" type="datetimeFigureOut">
               <a:rPr lang="en-US" smtClean="0"/>
-              <a:t>3/8/2023</a:t>
+              <a:t>3/11/2023</a:t>
             </a:fld>
             <a:endParaRPr lang="en-US"/>
           </a:p>
@@ -4315,7 +4315,7 @@
         <p:spPr>
           <a:xfrm>
             <a:off x="362992" y="369537"/>
-            <a:ext cx="8095208" cy="2708434"/>
+            <a:ext cx="8095208" cy="3447098"/>
           </a:xfrm>
           <a:prstGeom prst="rect">
             <a:avLst/>
@@ -4360,7 +4360,13 @@
             </a:r>
             <a:r>
               <a:rPr lang="en-US" sz="1200" dirty="0"/>
-              <a:t>– colors on the MC6 Pro are not currently directly controllable through the </a:t>
+              <a:t>– </a:t>
+            </a:r>
+          </a:p>
+          <a:p>
+            <a:r>
+              <a:rPr lang="en-US" sz="1200" dirty="0"/>
+              <a:t>Colors on the MC6 Pro are not fully controllable through the </a:t>
             </a:r>
             <a:r>
               <a:rPr lang="en-US" sz="1200" dirty="0" err="1"/>
@@ -4368,7 +4374,24 @@
             </a:r>
             <a:r>
               <a:rPr lang="en-US" sz="1200" dirty="0"/>
-              <a:t> extension.  This is a function of the newness of the MC6 Pro and the fact that the hardware does not yet allow colors to be controlled externally by MIDI.  The Morningstar developers expect this ability to be added soon, at which point the extension should allow you to change display colors on a per-widget basis.</a:t>
+              <a:t> extension at this time.  The Morningstar developers expect this ability to be added soon, at which point the extension will be adjusted to allow widgets to control display colors on a preset basis.</a:t>
+            </a:r>
+          </a:p>
+          <a:p>
+            <a:endParaRPr lang="en-US" sz="1200" dirty="0"/>
+          </a:p>
+          <a:p>
+            <a:r>
+              <a:rPr lang="en-US" sz="1200" dirty="0"/>
+              <a:t>Currently the extension has the ability to control the center bar color in a limited way.  It is set up now so that the center bar becomes orange when </a:t>
+            </a:r>
+            <a:r>
+              <a:rPr lang="en-US" sz="1200" dirty="0" err="1"/>
+              <a:t>GigPerformer</a:t>
+            </a:r>
+            <a:r>
+              <a:rPr lang="en-US" sz="1200" dirty="0"/>
+              <a:t> is in Setlist mode and purple when it is not.  Presets on page one are green, page two is red.  This can be changed by editing the MC6 Pro preset.  You should be able to figure this out and change them pretty quickly using the Morningstar Editor.  I’m not going into detailed instructions at this point because I expect it all to change in the next version or two of the MC6 Pro firmware.</a:t>
             </a:r>
           </a:p>
           <a:p>
@@ -4385,11 +4408,8 @@
             </a:r>
             <a:r>
               <a:rPr lang="en-US" sz="1200" dirty="0"/>
-              <a:t>– Morningstar currently expect an MC8 Pro to be released late in 2023, but that is speculative at this time.  I expect to buy one as soon as it is available and integrate it into this extension.</a:t>
-            </a:r>
-          </a:p>
-          <a:p>
-            <a:endParaRPr lang="en-US" sz="1200" dirty="0"/>
+              <a:t>– Morningstar currently expect an MC8 Pro to be released late in 2023, but that is speculative at this time.</a:t>
+            </a:r>
           </a:p>
         </p:txBody>
       </p:sp>

</xml_diff>

<commit_message>
Mac MC6 Pro midi port name added to default search
</commit_message>
<xml_diff>
--- a/MC8.pptx
+++ b/MC8.pptx
@@ -256,7 +256,7 @@
           <a:p>
             <a:fld id="{95339B3D-D54B-4A71-BAD3-52665AB11A2C}" type="datetimeFigureOut">
               <a:rPr lang="en-US" smtClean="0"/>
-              <a:t>3/26/2023</a:t>
+              <a:t>3/19/2024</a:t>
             </a:fld>
             <a:endParaRPr lang="en-US"/>
           </a:p>
@@ -426,7 +426,7 @@
           <a:p>
             <a:fld id="{95339B3D-D54B-4A71-BAD3-52665AB11A2C}" type="datetimeFigureOut">
               <a:rPr lang="en-US" smtClean="0"/>
-              <a:t>3/26/2023</a:t>
+              <a:t>3/19/2024</a:t>
             </a:fld>
             <a:endParaRPr lang="en-US"/>
           </a:p>
@@ -606,7 +606,7 @@
           <a:p>
             <a:fld id="{95339B3D-D54B-4A71-BAD3-52665AB11A2C}" type="datetimeFigureOut">
               <a:rPr lang="en-US" smtClean="0"/>
-              <a:t>3/26/2023</a:t>
+              <a:t>3/19/2024</a:t>
             </a:fld>
             <a:endParaRPr lang="en-US"/>
           </a:p>
@@ -776,7 +776,7 @@
           <a:p>
             <a:fld id="{95339B3D-D54B-4A71-BAD3-52665AB11A2C}" type="datetimeFigureOut">
               <a:rPr lang="en-US" smtClean="0"/>
-              <a:t>3/26/2023</a:t>
+              <a:t>3/19/2024</a:t>
             </a:fld>
             <a:endParaRPr lang="en-US"/>
           </a:p>
@@ -1020,7 +1020,7 @@
           <a:p>
             <a:fld id="{95339B3D-D54B-4A71-BAD3-52665AB11A2C}" type="datetimeFigureOut">
               <a:rPr lang="en-US" smtClean="0"/>
-              <a:t>3/26/2023</a:t>
+              <a:t>3/19/2024</a:t>
             </a:fld>
             <a:endParaRPr lang="en-US"/>
           </a:p>
@@ -1252,7 +1252,7 @@
           <a:p>
             <a:fld id="{95339B3D-D54B-4A71-BAD3-52665AB11A2C}" type="datetimeFigureOut">
               <a:rPr lang="en-US" smtClean="0"/>
-              <a:t>3/26/2023</a:t>
+              <a:t>3/19/2024</a:t>
             </a:fld>
             <a:endParaRPr lang="en-US"/>
           </a:p>
@@ -1619,7 +1619,7 @@
           <a:p>
             <a:fld id="{95339B3D-D54B-4A71-BAD3-52665AB11A2C}" type="datetimeFigureOut">
               <a:rPr lang="en-US" smtClean="0"/>
-              <a:t>3/26/2023</a:t>
+              <a:t>3/19/2024</a:t>
             </a:fld>
             <a:endParaRPr lang="en-US"/>
           </a:p>
@@ -1737,7 +1737,7 @@
           <a:p>
             <a:fld id="{95339B3D-D54B-4A71-BAD3-52665AB11A2C}" type="datetimeFigureOut">
               <a:rPr lang="en-US" smtClean="0"/>
-              <a:t>3/26/2023</a:t>
+              <a:t>3/19/2024</a:t>
             </a:fld>
             <a:endParaRPr lang="en-US"/>
           </a:p>
@@ -1832,7 +1832,7 @@
           <a:p>
             <a:fld id="{95339B3D-D54B-4A71-BAD3-52665AB11A2C}" type="datetimeFigureOut">
               <a:rPr lang="en-US" smtClean="0"/>
-              <a:t>3/26/2023</a:t>
+              <a:t>3/19/2024</a:t>
             </a:fld>
             <a:endParaRPr lang="en-US"/>
           </a:p>
@@ -2109,7 +2109,7 @@
           <a:p>
             <a:fld id="{95339B3D-D54B-4A71-BAD3-52665AB11A2C}" type="datetimeFigureOut">
               <a:rPr lang="en-US" smtClean="0"/>
-              <a:t>3/26/2023</a:t>
+              <a:t>3/19/2024</a:t>
             </a:fld>
             <a:endParaRPr lang="en-US"/>
           </a:p>
@@ -2366,7 +2366,7 @@
           <a:p>
             <a:fld id="{95339B3D-D54B-4A71-BAD3-52665AB11A2C}" type="datetimeFigureOut">
               <a:rPr lang="en-US" smtClean="0"/>
-              <a:t>3/26/2023</a:t>
+              <a:t>3/19/2024</a:t>
             </a:fld>
             <a:endParaRPr lang="en-US"/>
           </a:p>
@@ -2579,7 +2579,7 @@
           <a:p>
             <a:fld id="{95339B3D-D54B-4A71-BAD3-52665AB11A2C}" type="datetimeFigureOut">
               <a:rPr lang="en-US" smtClean="0"/>
-              <a:t>3/26/2023</a:t>
+              <a:t>3/19/2024</a:t>
             </a:fld>
             <a:endParaRPr lang="en-US"/>
           </a:p>
@@ -5103,7 +5103,7 @@
             </a:r>
             <a:r>
               <a:rPr lang="en-US" sz="1200" dirty="0"/>
-              <a:t>– Morningstar currently expect an MC8 Pro to be released late in 2023, but that is speculative at this time.</a:t>
+              <a:t>– Morningstar currently expect an MC8 Pro to be released late in 2024, but that is speculative at this time.</a:t>
             </a:r>
           </a:p>
         </p:txBody>

</xml_diff>

<commit_message>
Documentation and preset bank update for MC8 Pro
</commit_message>
<xml_diff>
--- a/MC8.pptx
+++ b/MC8.pptx
@@ -256,7 +256,7 @@
           <a:p>
             <a:fld id="{95339B3D-D54B-4A71-BAD3-52665AB11A2C}" type="datetimeFigureOut">
               <a:rPr lang="en-US" smtClean="0"/>
-              <a:t>3/19/2024</a:t>
+              <a:t>6/21/2025</a:t>
             </a:fld>
             <a:endParaRPr lang="en-US"/>
           </a:p>
@@ -426,7 +426,7 @@
           <a:p>
             <a:fld id="{95339B3D-D54B-4A71-BAD3-52665AB11A2C}" type="datetimeFigureOut">
               <a:rPr lang="en-US" smtClean="0"/>
-              <a:t>3/19/2024</a:t>
+              <a:t>6/21/2025</a:t>
             </a:fld>
             <a:endParaRPr lang="en-US"/>
           </a:p>
@@ -606,7 +606,7 @@
           <a:p>
             <a:fld id="{95339B3D-D54B-4A71-BAD3-52665AB11A2C}" type="datetimeFigureOut">
               <a:rPr lang="en-US" smtClean="0"/>
-              <a:t>3/19/2024</a:t>
+              <a:t>6/21/2025</a:t>
             </a:fld>
             <a:endParaRPr lang="en-US"/>
           </a:p>
@@ -776,7 +776,7 @@
           <a:p>
             <a:fld id="{95339B3D-D54B-4A71-BAD3-52665AB11A2C}" type="datetimeFigureOut">
               <a:rPr lang="en-US" smtClean="0"/>
-              <a:t>3/19/2024</a:t>
+              <a:t>6/21/2025</a:t>
             </a:fld>
             <a:endParaRPr lang="en-US"/>
           </a:p>
@@ -1020,7 +1020,7 @@
           <a:p>
             <a:fld id="{95339B3D-D54B-4A71-BAD3-52665AB11A2C}" type="datetimeFigureOut">
               <a:rPr lang="en-US" smtClean="0"/>
-              <a:t>3/19/2024</a:t>
+              <a:t>6/21/2025</a:t>
             </a:fld>
             <a:endParaRPr lang="en-US"/>
           </a:p>
@@ -1252,7 +1252,7 @@
           <a:p>
             <a:fld id="{95339B3D-D54B-4A71-BAD3-52665AB11A2C}" type="datetimeFigureOut">
               <a:rPr lang="en-US" smtClean="0"/>
-              <a:t>3/19/2024</a:t>
+              <a:t>6/21/2025</a:t>
             </a:fld>
             <a:endParaRPr lang="en-US"/>
           </a:p>
@@ -1619,7 +1619,7 @@
           <a:p>
             <a:fld id="{95339B3D-D54B-4A71-BAD3-52665AB11A2C}" type="datetimeFigureOut">
               <a:rPr lang="en-US" smtClean="0"/>
-              <a:t>3/19/2024</a:t>
+              <a:t>6/21/2025</a:t>
             </a:fld>
             <a:endParaRPr lang="en-US"/>
           </a:p>
@@ -1737,7 +1737,7 @@
           <a:p>
             <a:fld id="{95339B3D-D54B-4A71-BAD3-52665AB11A2C}" type="datetimeFigureOut">
               <a:rPr lang="en-US" smtClean="0"/>
-              <a:t>3/19/2024</a:t>
+              <a:t>6/21/2025</a:t>
             </a:fld>
             <a:endParaRPr lang="en-US"/>
           </a:p>
@@ -1832,7 +1832,7 @@
           <a:p>
             <a:fld id="{95339B3D-D54B-4A71-BAD3-52665AB11A2C}" type="datetimeFigureOut">
               <a:rPr lang="en-US" smtClean="0"/>
-              <a:t>3/19/2024</a:t>
+              <a:t>6/21/2025</a:t>
             </a:fld>
             <a:endParaRPr lang="en-US"/>
           </a:p>
@@ -2109,7 +2109,7 @@
           <a:p>
             <a:fld id="{95339B3D-D54B-4A71-BAD3-52665AB11A2C}" type="datetimeFigureOut">
               <a:rPr lang="en-US" smtClean="0"/>
-              <a:t>3/19/2024</a:t>
+              <a:t>6/21/2025</a:t>
             </a:fld>
             <a:endParaRPr lang="en-US"/>
           </a:p>
@@ -2366,7 +2366,7 @@
           <a:p>
             <a:fld id="{95339B3D-D54B-4A71-BAD3-52665AB11A2C}" type="datetimeFigureOut">
               <a:rPr lang="en-US" smtClean="0"/>
-              <a:t>3/19/2024</a:t>
+              <a:t>6/21/2025</a:t>
             </a:fld>
             <a:endParaRPr lang="en-US"/>
           </a:p>
@@ -2579,7 +2579,7 @@
           <a:p>
             <a:fld id="{95339B3D-D54B-4A71-BAD3-52665AB11A2C}" type="datetimeFigureOut">
               <a:rPr lang="en-US" smtClean="0"/>
-              <a:t>3/19/2024</a:t>
+              <a:t>6/21/2025</a:t>
             </a:fld>
             <a:endParaRPr lang="en-US"/>
           </a:p>
@@ -2986,49 +2986,33 @@
       </p:grpSpPr>
       <p:pic>
         <p:nvPicPr>
-          <p:cNvPr id="1026" name="Picture 2">
+          <p:cNvPr id="7" name="Picture 6">
             <a:extLst>
               <a:ext uri="{FF2B5EF4-FFF2-40B4-BE49-F238E27FC236}">
-                <a16:creationId xmlns:a16="http://schemas.microsoft.com/office/drawing/2014/main" id="{F1DFBF7E-673D-C59C-4F6D-E850BEAD34C8}"/>
+                <a16:creationId xmlns:a16="http://schemas.microsoft.com/office/drawing/2014/main" id="{375558BA-5A1D-B68E-AE07-D33B5BB62573}"/>
               </a:ext>
             </a:extLst>
           </p:cNvPr>
           <p:cNvPicPr>
-            <a:picLocks noChangeAspect="1" noChangeArrowheads="1"/>
+            <a:picLocks noChangeAspect="1"/>
           </p:cNvPicPr>
           <p:nvPr/>
         </p:nvPicPr>
         <p:blipFill>
-          <a:blip r:embed="rId2">
-            <a:extLst>
-              <a:ext uri="{28A0092B-C50C-407E-A947-70E740481C1C}">
-                <a14:useLocalDpi xmlns:a14="http://schemas.microsoft.com/office/drawing/2010/main" val="0"/>
-              </a:ext>
-            </a:extLst>
-          </a:blip>
-          <a:srcRect/>
+          <a:blip r:embed="rId2"/>
+          <a:srcRect t="7638" b="23436"/>
           <a:stretch>
             <a:fillRect/>
           </a:stretch>
         </p:blipFill>
-        <p:spPr bwMode="auto">
+        <p:spPr>
           <a:xfrm>
-            <a:off x="966158" y="1701820"/>
-            <a:ext cx="7211683" cy="4198050"/>
+            <a:off x="84842" y="1365275"/>
+            <a:ext cx="8964891" cy="4650685"/>
           </a:xfrm>
           <a:prstGeom prst="rect">
             <a:avLst/>
           </a:prstGeom>
-          <a:noFill/>
-          <a:extLst>
-            <a:ext uri="{909E8E84-426E-40DD-AFC4-6F175D3DCCD1}">
-              <a14:hiddenFill xmlns:a14="http://schemas.microsoft.com/office/drawing/2010/main">
-                <a:solidFill>
-                  <a:srgbClr val="FFFFFF"/>
-                </a:solidFill>
-              </a14:hiddenFill>
-            </a:ext>
-          </a:extLst>
         </p:spPr>
       </p:pic>
       <p:sp>
@@ -3170,6 +3154,9 @@
             </a:avLst>
           </a:prstGeom>
           <a:ln>
+            <a:solidFill>
+              <a:schemeClr val="tx1"/>
+            </a:solidFill>
             <a:tailEnd type="triangle"/>
           </a:ln>
         </p:spPr>
@@ -3209,6 +3196,9 @@
             <a:avLst/>
           </a:prstGeom>
           <a:ln>
+            <a:solidFill>
+              <a:schemeClr val="tx1"/>
+            </a:solidFill>
             <a:tailEnd type="triangle"/>
           </a:ln>
         </p:spPr>
@@ -3248,6 +3238,9 @@
             <a:avLst/>
           </a:prstGeom>
           <a:ln>
+            <a:solidFill>
+              <a:schemeClr val="tx1"/>
+            </a:solidFill>
             <a:tailEnd type="triangle"/>
           </a:ln>
         </p:spPr>
@@ -3292,6 +3285,9 @@
             </a:avLst>
           </a:prstGeom>
           <a:ln>
+            <a:solidFill>
+              <a:schemeClr val="tx1"/>
+            </a:solidFill>
             <a:tailEnd type="triangle"/>
           </a:ln>
         </p:spPr>
@@ -3324,8 +3320,8 @@
         </p:nvSpPr>
         <p:spPr>
           <a:xfrm>
-            <a:off x="3593749" y="4347058"/>
-            <a:ext cx="1816075" cy="338554"/>
+            <a:off x="3376931" y="4205654"/>
+            <a:ext cx="2393091" cy="338554"/>
           </a:xfrm>
           <a:prstGeom prst="rect">
             <a:avLst/>
@@ -3344,7 +3340,23 @@
                   <a:schemeClr val="bg1"/>
                 </a:solidFill>
               </a:rPr>
-              <a:t>Widget (FX) Toggles</a:t>
+              <a:t>Variation / </a:t>
+            </a:r>
+            <a:r>
+              <a:rPr lang="en-US" sz="1600" dirty="0" err="1">
+                <a:solidFill>
+                  <a:schemeClr val="bg1"/>
+                </a:solidFill>
+              </a:rPr>
+              <a:t>Songpart</a:t>
+            </a:r>
+            <a:r>
+              <a:rPr lang="en-US" sz="1600" dirty="0">
+                <a:solidFill>
+                  <a:schemeClr val="bg1"/>
+                </a:solidFill>
+              </a:rPr>
+              <a:t> select</a:t>
             </a:r>
           </a:p>
         </p:txBody>
@@ -3365,7 +3377,7 @@
         </p:nvCxnSpPr>
         <p:spPr>
           <a:xfrm flipV="1">
-            <a:off x="5172969" y="4264331"/>
+            <a:off x="5295520" y="4075800"/>
             <a:ext cx="0" cy="129396"/>
           </a:xfrm>
           <a:prstGeom prst="straightConnector1">
@@ -3409,7 +3421,7 @@
         </p:nvCxnSpPr>
         <p:spPr>
           <a:xfrm flipV="1">
-            <a:off x="3919258" y="4264331"/>
+            <a:off x="3796707" y="4075800"/>
             <a:ext cx="0" cy="129396"/>
           </a:xfrm>
           <a:prstGeom prst="straightConnector1">
@@ -3453,7 +3465,7 @@
         </p:nvCxnSpPr>
         <p:spPr>
           <a:xfrm flipV="1">
-            <a:off x="2648309" y="4264331"/>
+            <a:off x="2252384" y="4075800"/>
             <a:ext cx="0" cy="129396"/>
           </a:xfrm>
           <a:prstGeom prst="straightConnector1">
@@ -3497,7 +3509,7 @@
         </p:nvCxnSpPr>
         <p:spPr>
           <a:xfrm flipV="1">
-            <a:off x="6458299" y="4264331"/>
+            <a:off x="6816515" y="4075800"/>
             <a:ext cx="0" cy="129396"/>
           </a:xfrm>
           <a:prstGeom prst="straightConnector1">
@@ -3539,7 +3551,7 @@
         </p:nvSpPr>
         <p:spPr>
           <a:xfrm>
-            <a:off x="2299005" y="6065608"/>
+            <a:off x="2204735" y="6065608"/>
             <a:ext cx="2356158" cy="338554"/>
           </a:xfrm>
           <a:prstGeom prst="rect">
@@ -3576,13 +3588,16 @@
         </p:nvCxnSpPr>
         <p:spPr>
           <a:xfrm flipV="1">
-            <a:off x="2725947" y="5896998"/>
+            <a:off x="2509129" y="5896998"/>
             <a:ext cx="0" cy="165738"/>
           </a:xfrm>
           <a:prstGeom prst="straightConnector1">
             <a:avLst/>
           </a:prstGeom>
           <a:ln>
+            <a:solidFill>
+              <a:srgbClr val="C00000"/>
+            </a:solidFill>
             <a:tailEnd type="triangle"/>
           </a:ln>
         </p:spPr>
@@ -3617,13 +3632,16 @@
         </p:nvCxnSpPr>
         <p:spPr>
           <a:xfrm flipV="1">
-            <a:off x="4258577" y="5896998"/>
+            <a:off x="4230296" y="5896998"/>
             <a:ext cx="0" cy="165738"/>
           </a:xfrm>
           <a:prstGeom prst="straightConnector1">
             <a:avLst/>
           </a:prstGeom>
           <a:ln>
+            <a:solidFill>
+              <a:srgbClr val="C00000"/>
+            </a:solidFill>
             <a:tailEnd type="triangle"/>
           </a:ln>
         </p:spPr>
@@ -3656,7 +3674,7 @@
         </p:nvSpPr>
         <p:spPr>
           <a:xfrm>
-            <a:off x="4668389" y="6065608"/>
+            <a:off x="4800367" y="6065608"/>
             <a:ext cx="2082430" cy="338554"/>
           </a:xfrm>
           <a:prstGeom prst="rect">
@@ -3693,13 +3711,16 @@
         </p:nvCxnSpPr>
         <p:spPr>
           <a:xfrm flipV="1">
-            <a:off x="4905543" y="5896998"/>
+            <a:off x="5009240" y="5896998"/>
             <a:ext cx="0" cy="165738"/>
           </a:xfrm>
           <a:prstGeom prst="straightConnector1">
             <a:avLst/>
           </a:prstGeom>
           <a:ln>
+            <a:solidFill>
+              <a:srgbClr val="C00000"/>
+            </a:solidFill>
             <a:tailEnd type="triangle"/>
           </a:ln>
         </p:spPr>
@@ -3734,13 +3755,16 @@
         </p:nvCxnSpPr>
         <p:spPr>
           <a:xfrm flipV="1">
-            <a:off x="6438173" y="5896998"/>
+            <a:off x="6711553" y="5896998"/>
             <a:ext cx="0" cy="165738"/>
           </a:xfrm>
           <a:prstGeom prst="straightConnector1">
             <a:avLst/>
           </a:prstGeom>
           <a:ln>
+            <a:solidFill>
+              <a:srgbClr val="C00000"/>
+            </a:solidFill>
             <a:tailEnd type="triangle"/>
           </a:ln>
         </p:spPr>
@@ -3759,6 +3783,51 @@
           </a:fontRef>
         </p:style>
       </p:cxnSp>
+      <p:sp>
+        <p:nvSpPr>
+          <p:cNvPr id="2" name="AutoShape 2">
+            <a:extLst>
+              <a:ext uri="{FF2B5EF4-FFF2-40B4-BE49-F238E27FC236}">
+                <a16:creationId xmlns:a16="http://schemas.microsoft.com/office/drawing/2014/main" id="{87378505-3860-23E2-3A42-E2225A9D162E}"/>
+              </a:ext>
+            </a:extLst>
+          </p:cNvPr>
+          <p:cNvSpPr>
+            <a:spLocks noChangeAspect="1" noChangeArrowheads="1"/>
+          </p:cNvSpPr>
+          <p:nvPr/>
+        </p:nvSpPr>
+        <p:spPr bwMode="auto">
+          <a:xfrm>
+            <a:off x="4419600" y="3276600"/>
+            <a:ext cx="304800" cy="304800"/>
+          </a:xfrm>
+          <a:prstGeom prst="rect">
+            <a:avLst/>
+          </a:prstGeom>
+          <a:noFill/>
+          <a:extLst>
+            <a:ext uri="{909E8E84-426E-40DD-AFC4-6F175D3DCCD1}">
+              <a14:hiddenFill xmlns:a14="http://schemas.microsoft.com/office/drawing/2010/main">
+                <a:solidFill>
+                  <a:srgbClr val="FFFFFF"/>
+                </a:solidFill>
+              </a14:hiddenFill>
+            </a:ext>
+          </a:extLst>
+        </p:spPr>
+        <p:txBody>
+          <a:bodyPr vert="horz" wrap="square" lIns="91440" tIns="45720" rIns="91440" bIns="45720" numCol="1" anchor="t" anchorCtr="0" compatLnSpc="1">
+            <a:prstTxWarp prst="textNoShape">
+              <a:avLst/>
+            </a:prstTxWarp>
+          </a:bodyPr>
+          <a:lstStyle/>
+          <a:p>
+            <a:endParaRPr lang="en-US"/>
+          </a:p>
+        </p:txBody>
+      </p:sp>
     </p:spTree>
     <p:extLst>
       <p:ext uri="{BB962C8B-B14F-4D97-AF65-F5344CB8AC3E}">
@@ -5441,7 +5510,7 @@
             </a:r>
             <a:r>
               <a:rPr lang="en-US" sz="1200" dirty="0"/>
-              <a:t>” is optional but suggested.  It will control what appears on the top and bottom rows of your controller by default.  This is described in more detail on page 10 of this document.</a:t>
+              <a:t>” is optional but suggested.  It will control what appears on the top and bottom rows of your controller by default.  This is described in more detail on page 11 of this document.</a:t>
             </a:r>
           </a:p>
           <a:p>

</xml_diff>

<commit_message>
Updates and minor display hiccup fixes, added [nextsong] [prevsong] special caption names, still WIP
</commit_message>
<xml_diff>
--- a/MC8.pptx
+++ b/MC8.pptx
@@ -7,8 +7,8 @@
   <p:sldIdLst>
     <p:sldId id="264" r:id="rId2"/>
     <p:sldId id="268" r:id="rId3"/>
-    <p:sldId id="269" r:id="rId4"/>
-    <p:sldId id="265" r:id="rId5"/>
+    <p:sldId id="265" r:id="rId4"/>
+    <p:sldId id="269" r:id="rId5"/>
     <p:sldId id="262" r:id="rId6"/>
     <p:sldId id="256" r:id="rId7"/>
     <p:sldId id="257" r:id="rId8"/>
@@ -256,7 +256,7 @@
           <a:p>
             <a:fld id="{95339B3D-D54B-4A71-BAD3-52665AB11A2C}" type="datetimeFigureOut">
               <a:rPr lang="en-US" smtClean="0"/>
-              <a:t>6/21/2025</a:t>
+              <a:t>12/28/2025</a:t>
             </a:fld>
             <a:endParaRPr lang="en-US"/>
           </a:p>
@@ -426,7 +426,7 @@
           <a:p>
             <a:fld id="{95339B3D-D54B-4A71-BAD3-52665AB11A2C}" type="datetimeFigureOut">
               <a:rPr lang="en-US" smtClean="0"/>
-              <a:t>6/21/2025</a:t>
+              <a:t>12/28/2025</a:t>
             </a:fld>
             <a:endParaRPr lang="en-US"/>
           </a:p>
@@ -606,7 +606,7 @@
           <a:p>
             <a:fld id="{95339B3D-D54B-4A71-BAD3-52665AB11A2C}" type="datetimeFigureOut">
               <a:rPr lang="en-US" smtClean="0"/>
-              <a:t>6/21/2025</a:t>
+              <a:t>12/28/2025</a:t>
             </a:fld>
             <a:endParaRPr lang="en-US"/>
           </a:p>
@@ -776,7 +776,7 @@
           <a:p>
             <a:fld id="{95339B3D-D54B-4A71-BAD3-52665AB11A2C}" type="datetimeFigureOut">
               <a:rPr lang="en-US" smtClean="0"/>
-              <a:t>6/21/2025</a:t>
+              <a:t>12/28/2025</a:t>
             </a:fld>
             <a:endParaRPr lang="en-US"/>
           </a:p>
@@ -1020,7 +1020,7 @@
           <a:p>
             <a:fld id="{95339B3D-D54B-4A71-BAD3-52665AB11A2C}" type="datetimeFigureOut">
               <a:rPr lang="en-US" smtClean="0"/>
-              <a:t>6/21/2025</a:t>
+              <a:t>12/28/2025</a:t>
             </a:fld>
             <a:endParaRPr lang="en-US"/>
           </a:p>
@@ -1252,7 +1252,7 @@
           <a:p>
             <a:fld id="{95339B3D-D54B-4A71-BAD3-52665AB11A2C}" type="datetimeFigureOut">
               <a:rPr lang="en-US" smtClean="0"/>
-              <a:t>6/21/2025</a:t>
+              <a:t>12/28/2025</a:t>
             </a:fld>
             <a:endParaRPr lang="en-US"/>
           </a:p>
@@ -1619,7 +1619,7 @@
           <a:p>
             <a:fld id="{95339B3D-D54B-4A71-BAD3-52665AB11A2C}" type="datetimeFigureOut">
               <a:rPr lang="en-US" smtClean="0"/>
-              <a:t>6/21/2025</a:t>
+              <a:t>12/28/2025</a:t>
             </a:fld>
             <a:endParaRPr lang="en-US"/>
           </a:p>
@@ -1737,7 +1737,7 @@
           <a:p>
             <a:fld id="{95339B3D-D54B-4A71-BAD3-52665AB11A2C}" type="datetimeFigureOut">
               <a:rPr lang="en-US" smtClean="0"/>
-              <a:t>6/21/2025</a:t>
+              <a:t>12/28/2025</a:t>
             </a:fld>
             <a:endParaRPr lang="en-US"/>
           </a:p>
@@ -1832,7 +1832,7 @@
           <a:p>
             <a:fld id="{95339B3D-D54B-4A71-BAD3-52665AB11A2C}" type="datetimeFigureOut">
               <a:rPr lang="en-US" smtClean="0"/>
-              <a:t>6/21/2025</a:t>
+              <a:t>12/28/2025</a:t>
             </a:fld>
             <a:endParaRPr lang="en-US"/>
           </a:p>
@@ -2109,7 +2109,7 @@
           <a:p>
             <a:fld id="{95339B3D-D54B-4A71-BAD3-52665AB11A2C}" type="datetimeFigureOut">
               <a:rPr lang="en-US" smtClean="0"/>
-              <a:t>6/21/2025</a:t>
+              <a:t>12/28/2025</a:t>
             </a:fld>
             <a:endParaRPr lang="en-US"/>
           </a:p>
@@ -2366,7 +2366,7 @@
           <a:p>
             <a:fld id="{95339B3D-D54B-4A71-BAD3-52665AB11A2C}" type="datetimeFigureOut">
               <a:rPr lang="en-US" smtClean="0"/>
-              <a:t>6/21/2025</a:t>
+              <a:t>12/28/2025</a:t>
             </a:fld>
             <a:endParaRPr lang="en-US"/>
           </a:p>
@@ -2579,7 +2579,7 @@
           <a:p>
             <a:fld id="{95339B3D-D54B-4A71-BAD3-52665AB11A2C}" type="datetimeFigureOut">
               <a:rPr lang="en-US" smtClean="0"/>
-              <a:t>6/21/2025</a:t>
+              <a:t>12/28/2025</a:t>
             </a:fld>
             <a:endParaRPr lang="en-US"/>
           </a:p>
@@ -5216,7 +5216,7 @@
         <p:spPr>
           <a:xfrm>
             <a:off x="362992" y="369537"/>
-            <a:ext cx="8095208" cy="5878532"/>
+            <a:ext cx="8095208" cy="6063198"/>
           </a:xfrm>
           <a:prstGeom prst="rect">
             <a:avLst/>
@@ -5338,7 +5338,15 @@
             </a:pPr>
             <a:r>
               <a:rPr lang="en-US" sz="1200" dirty="0"/>
-              <a:t>Install the appropriate bank preset from the zip file into any open bank your controller using the Morningstar editor</a:t>
+              <a:t>Install the appropriate bank preset from the release into any open bank your controller using the Morningstar editor. In the editor choose “Controller Backup” then scroll down to “Restore controller presets” and select the </a:t>
+            </a:r>
+            <a:r>
+              <a:rPr lang="en-US" sz="1200" dirty="0" err="1"/>
+              <a:t>json</a:t>
+            </a:r>
+            <a:r>
+              <a:rPr lang="en-US" sz="1200" dirty="0"/>
+              <a:t> file</a:t>
             </a:r>
           </a:p>
           <a:p>
@@ -5399,7 +5407,7 @@
           <a:p>
             <a:r>
               <a:rPr lang="en-US" sz="1200" dirty="0"/>
-              <a:t>The extension needs to know how to communicate with your controller.  It looks for this information in three text widgets that should be created in the Global Rackspace.</a:t>
+              <a:t>The extension needs to know how to communicate with your controller.  It tries to find the right port automatically, but if it cannot find it the extension looks for the correct name in three text widgets that should be created in the Global Rackspace.</a:t>
             </a:r>
           </a:p>
           <a:p>
@@ -5561,7 +5569,7 @@
         <p:spPr>
           <a:xfrm>
             <a:off x="362992" y="369537"/>
-            <a:ext cx="8095208" cy="6032421"/>
+            <a:ext cx="8095208" cy="5878532"/>
           </a:xfrm>
           <a:prstGeom prst="rect">
             <a:avLst/>
@@ -5576,21 +5584,15 @@
           <a:p>
             <a:r>
               <a:rPr lang="en-US" sz="1400" b="1" dirty="0"/>
-              <a:t>Basic Toggle Controls</a:t>
-            </a:r>
-          </a:p>
-          <a:p>
-            <a:r>
-              <a:rPr lang="en-US" sz="1200" dirty="0"/>
-              <a:t>If you’re starting from a new Rackspace (i.e., not one from the demo </a:t>
-            </a:r>
-            <a:r>
-              <a:rPr lang="en-US" sz="1200" dirty="0" err="1"/>
-              <a:t>gigfile</a:t>
-            </a:r>
-            <a:r>
-              <a:rPr lang="en-US" sz="1200" dirty="0"/>
-              <a:t>) assigning button-type widgets to your footswitches is very simple.  All you have to do is edit the properties of the widget.</a:t>
+              <a:t>Design Goal of the </a:t>
+            </a:r>
+            <a:r>
+              <a:rPr lang="en-US" sz="1400" b="1" dirty="0" err="1"/>
+              <a:t>MCx</a:t>
+            </a:r>
+            <a:r>
+              <a:rPr lang="en-US" sz="1400" b="1" dirty="0"/>
+              <a:t> Extension</a:t>
             </a:r>
           </a:p>
           <a:p>
@@ -5599,55 +5601,39 @@
           <a:p>
             <a:r>
               <a:rPr lang="en-US" sz="1200" dirty="0"/>
-              <a:t>To assign widgets to the switches on the bottom row:</a:t>
-            </a:r>
-          </a:p>
-          <a:p>
-            <a:pPr marL="628650" lvl="1" indent="-171450">
-              <a:buFont typeface="Arial" panose="020B0604020202020204" pitchFamily="34" charset="0"/>
-              <a:buChar char="•"/>
-            </a:pPr>
-            <a:r>
-              <a:rPr lang="en-US" sz="1200" dirty="0"/>
-              <a:t>Edit the widget and select the “Advanced” tab</a:t>
-            </a:r>
-          </a:p>
-          <a:p>
-            <a:pPr marL="628650" lvl="1" indent="-171450">
-              <a:buFont typeface="Arial" panose="020B0604020202020204" pitchFamily="34" charset="0"/>
-              <a:buChar char="•"/>
-            </a:pPr>
-            <a:r>
-              <a:rPr lang="en-US" sz="1200" dirty="0"/>
-              <a:t>In the “OSC/</a:t>
-            </a:r>
-            <a:r>
-              <a:rPr lang="en-US" sz="1200" dirty="0" err="1"/>
-              <a:t>GPScript</a:t>
-            </a:r>
-            <a:r>
-              <a:rPr lang="en-US" sz="1200" dirty="0"/>
-              <a:t> Name” field type “mcx_b_fx_0”</a:t>
-            </a:r>
-          </a:p>
-          <a:p>
-            <a:pPr marL="628650" lvl="1" indent="-171450">
-              <a:buFont typeface="Arial" panose="020B0604020202020204" pitchFamily="34" charset="0"/>
-              <a:buChar char="•"/>
-            </a:pPr>
-            <a:r>
-              <a:rPr lang="en-US" sz="1200" dirty="0"/>
-              <a:t>This will assign the widget to the bottom left switch</a:t>
-            </a:r>
-          </a:p>
-          <a:p>
-            <a:pPr marL="628650" lvl="1" indent="-171450">
-              <a:buFont typeface="Arial" panose="020B0604020202020204" pitchFamily="34" charset="0"/>
-              <a:buChar char="•"/>
-            </a:pPr>
-            <a:r>
-              <a:rPr lang="en-US" sz="1200" dirty="0"/>
-              <a:t>Change the 0 to 1, 2, or 3 for the other bottom row switches</a:t>
+              <a:t>The goal for the extension was to make controlling </a:t>
+            </a:r>
+            <a:r>
+              <a:rPr lang="en-US" sz="1200" dirty="0" err="1"/>
+              <a:t>GigPerformer</a:t>
+            </a:r>
+            <a:r>
+              <a:rPr lang="en-US" sz="1200" dirty="0"/>
+              <a:t> with the MC8 simple, reliable, and flexible while keeping all configuration entirely within </a:t>
+            </a:r>
+            <a:r>
+              <a:rPr lang="en-US" sz="1200" dirty="0" err="1"/>
+              <a:t>GigPerformer</a:t>
+            </a:r>
+            <a:r>
+              <a:rPr lang="en-US" sz="1200" dirty="0"/>
+              <a:t>.  Specifically, to allow the MC8 to automatically stay in sync with any changes made in </a:t>
+            </a:r>
+            <a:r>
+              <a:rPr lang="en-US" sz="1200" dirty="0" err="1"/>
+              <a:t>Rackspaces</a:t>
+            </a:r>
+            <a:r>
+              <a:rPr lang="en-US" sz="1200" dirty="0"/>
+              <a:t>, Variations, Songs, Setlists, etc.  It has been adapted to work with the MC6 and MC6 Pro.  Collectively we’ll refer to these as </a:t>
+            </a:r>
+            <a:r>
+              <a:rPr lang="en-US" sz="1200" dirty="0" err="1"/>
+              <a:t>MCx</a:t>
+            </a:r>
+            <a:r>
+              <a:rPr lang="en-US" sz="1200" dirty="0"/>
+              <a:t>.</a:t>
             </a:r>
           </a:p>
           <a:p>
@@ -5655,24 +5641,252 @@
           </a:p>
           <a:p>
             <a:r>
-              <a:rPr lang="en-US" sz="1200" b="1" i="1" dirty="0"/>
-              <a:t>To sync your Rackspace with the foot controller you must change </a:t>
-            </a:r>
-            <a:r>
-              <a:rPr lang="en-US" sz="1200" b="1" i="1" dirty="0" err="1"/>
+              <a:rPr lang="en-US" sz="1200" dirty="0"/>
+              <a:t>This extension requires setting one bank on the </a:t>
+            </a:r>
+            <a:r>
+              <a:rPr lang="en-US" sz="1200" dirty="0" err="1"/>
+              <a:t>MCx</a:t>
+            </a:r>
+            <a:r>
+              <a:rPr lang="en-US" sz="1200" dirty="0"/>
+              <a:t> to communicate with this </a:t>
+            </a:r>
+            <a:r>
+              <a:rPr lang="en-US" sz="1200" dirty="0" err="1"/>
+              <a:t>GigPerformer</a:t>
+            </a:r>
+            <a:r>
+              <a:rPr lang="en-US" sz="1200" dirty="0"/>
+              <a:t> extension.  Any bank can be used for this purpose.  When controlling </a:t>
+            </a:r>
+            <a:r>
+              <a:rPr lang="en-US" sz="1200" dirty="0" err="1"/>
+              <a:t>GigPerformer</a:t>
+            </a:r>
+            <a:r>
+              <a:rPr lang="en-US" sz="1200" dirty="0"/>
+              <a:t> with this extension the </a:t>
+            </a:r>
+            <a:r>
+              <a:rPr lang="en-US" sz="1200" dirty="0" err="1"/>
+              <a:t>MCx</a:t>
+            </a:r>
+            <a:r>
+              <a:rPr lang="en-US" sz="1200" dirty="0"/>
+              <a:t> will always be operating with that single bank.  To minimize risk of unintentionally overwriting your other banks, your </a:t>
+            </a:r>
+            <a:r>
+              <a:rPr lang="en-US" sz="1200" dirty="0" err="1"/>
+              <a:t>MCx</a:t>
+            </a:r>
+            <a:r>
+              <a:rPr lang="en-US" sz="1200" dirty="0"/>
+              <a:t> should be set to this </a:t>
+            </a:r>
+            <a:r>
+              <a:rPr lang="en-US" sz="1200" dirty="0" err="1"/>
+              <a:t>GigPerformer</a:t>
+            </a:r>
+            <a:r>
+              <a:rPr lang="en-US" sz="1200" dirty="0"/>
+              <a:t> bank before starting </a:t>
+            </a:r>
+            <a:r>
+              <a:rPr lang="en-US" sz="1200" dirty="0" err="1"/>
+              <a:t>GigPerformer</a:t>
+            </a:r>
+            <a:r>
+              <a:rPr lang="en-US" sz="1200" dirty="0"/>
+              <a:t> using this extension.</a:t>
+            </a:r>
+          </a:p>
+          <a:p>
+            <a:endParaRPr lang="en-US" sz="1200" dirty="0"/>
+          </a:p>
+          <a:p>
+            <a:r>
+              <a:rPr lang="en-US" sz="1200" dirty="0"/>
+              <a:t>With this GP bank the user will be able to assign any number of toggle widgets to </a:t>
+            </a:r>
+            <a:r>
+              <a:rPr lang="en-US" sz="1200" dirty="0" err="1"/>
+              <a:t>MCx</a:t>
+            </a:r>
+            <a:r>
+              <a:rPr lang="en-US" sz="1200" dirty="0"/>
+              <a:t> foot switches, switch among </a:t>
+            </a:r>
+            <a:r>
+              <a:rPr lang="en-US" sz="1200" dirty="0" err="1"/>
               <a:t>Rackspaces</a:t>
             </a:r>
             <a:r>
-              <a:rPr lang="en-US" sz="1200" b="1" i="1" dirty="0"/>
-              <a:t>, then come back</a:t>
-            </a:r>
-            <a:r>
-              <a:rPr lang="en-US" sz="1200" dirty="0"/>
-              <a:t>.  This is necessary because the extension scans widget names upon Rackspace entry.  It doesn’t know you renamed widgets until you change </a:t>
-            </a:r>
-            <a:r>
-              <a:rPr lang="en-US" sz="1200" dirty="0" err="1"/>
-              <a:t>Rackspaces</a:t>
+              <a:rPr lang="en-US" sz="1200" dirty="0"/>
+              <a:t> and Variations, or Songs and </a:t>
+            </a:r>
+            <a:r>
+              <a:rPr lang="en-US" sz="1200" dirty="0" err="1"/>
+              <a:t>Songparts</a:t>
+            </a:r>
+            <a:r>
+              <a:rPr lang="en-US" sz="1200" dirty="0"/>
+              <a:t>, and the </a:t>
+            </a:r>
+            <a:r>
+              <a:rPr lang="en-US" sz="1200" dirty="0" err="1"/>
+              <a:t>MCx</a:t>
+            </a:r>
+            <a:r>
+              <a:rPr lang="en-US" sz="1200" dirty="0"/>
+              <a:t> display will stay in sync to show which button is controlling what and what its present state is.</a:t>
+            </a:r>
+          </a:p>
+          <a:p>
+            <a:endParaRPr lang="en-US" sz="1200" dirty="0"/>
+          </a:p>
+          <a:p>
+            <a:r>
+              <a:rPr lang="en-US" sz="1200" dirty="0"/>
+              <a:t>This extension utilizes the </a:t>
+            </a:r>
+            <a:r>
+              <a:rPr lang="en-US" sz="1200" dirty="0" err="1"/>
+              <a:t>MCx</a:t>
+            </a:r>
+            <a:r>
+              <a:rPr lang="en-US" sz="1200" dirty="0"/>
+              <a:t> as a simple button and display device.   The </a:t>
+            </a:r>
+            <a:r>
+              <a:rPr lang="en-US" sz="1200" dirty="0" err="1"/>
+              <a:t>MCx</a:t>
+            </a:r>
+            <a:r>
+              <a:rPr lang="en-US" sz="1200" dirty="0"/>
+              <a:t> will display what the extension tells it to display, and the </a:t>
+            </a:r>
+            <a:r>
+              <a:rPr lang="en-US" sz="1200" dirty="0" err="1"/>
+              <a:t>MCx</a:t>
+            </a:r>
+            <a:r>
+              <a:rPr lang="en-US" sz="1200" dirty="0"/>
+              <a:t> will send the same messages whenever a </a:t>
+            </a:r>
+            <a:r>
+              <a:rPr lang="en-US" sz="1200" dirty="0" err="1"/>
+              <a:t>apecific</a:t>
+            </a:r>
+            <a:r>
+              <a:rPr lang="en-US" sz="1200" dirty="0"/>
+              <a:t> button is pressed.  All of the logic for controlling the displays and reacting to foot presses resides in the extension, not in the </a:t>
+            </a:r>
+            <a:r>
+              <a:rPr lang="en-US" sz="1200" dirty="0" err="1"/>
+              <a:t>MCx</a:t>
+            </a:r>
+            <a:r>
+              <a:rPr lang="en-US" sz="1200" dirty="0"/>
+              <a:t>.  The bank on the </a:t>
+            </a:r>
+            <a:r>
+              <a:rPr lang="en-US" sz="1200" dirty="0" err="1"/>
+              <a:t>MCx</a:t>
+            </a:r>
+            <a:r>
+              <a:rPr lang="en-US" sz="1200" dirty="0"/>
+              <a:t> that is used to control </a:t>
+            </a:r>
+            <a:r>
+              <a:rPr lang="en-US" sz="1200" dirty="0" err="1"/>
+              <a:t>GigPerformer</a:t>
+            </a:r>
+            <a:r>
+              <a:rPr lang="en-US" sz="1200" dirty="0"/>
+              <a:t> will never change, no matter how many racks, songs, variations, or widgets you choose to control with it.</a:t>
+            </a:r>
+          </a:p>
+          <a:p>
+            <a:endParaRPr lang="en-US" sz="1200" dirty="0"/>
+          </a:p>
+          <a:p>
+            <a:r>
+              <a:rPr lang="en-US" sz="1200" dirty="0"/>
+              <a:t>This means you can dedicate one “bank” on the </a:t>
+            </a:r>
+            <a:r>
+              <a:rPr lang="en-US" sz="1200" dirty="0" err="1"/>
+              <a:t>MCx</a:t>
+            </a:r>
+            <a:r>
+              <a:rPr lang="en-US" sz="1200" dirty="0"/>
+              <a:t> to </a:t>
+            </a:r>
+            <a:r>
+              <a:rPr lang="en-US" sz="1200" dirty="0" err="1"/>
+              <a:t>GigPerformer</a:t>
+            </a:r>
+            <a:r>
+              <a:rPr lang="en-US" sz="1200" dirty="0"/>
+              <a:t> and continue to use all other banks as you see fit.</a:t>
+            </a:r>
+          </a:p>
+          <a:p>
+            <a:endParaRPr lang="en-US" sz="1200" b="1" dirty="0"/>
+          </a:p>
+          <a:p>
+            <a:endParaRPr lang="en-US" sz="1200" b="1" dirty="0"/>
+          </a:p>
+          <a:p>
+            <a:r>
+              <a:rPr lang="en-US" sz="1400" b="1" dirty="0"/>
+              <a:t>Controlling </a:t>
+            </a:r>
+            <a:r>
+              <a:rPr lang="en-US" sz="1400" b="1" dirty="0" err="1"/>
+              <a:t>GigPerformer</a:t>
+            </a:r>
+            <a:r>
+              <a:rPr lang="en-US" sz="1400" b="1" dirty="0"/>
+              <a:t> with the </a:t>
+            </a:r>
+            <a:r>
+              <a:rPr lang="en-US" sz="1400" b="1" dirty="0" err="1"/>
+              <a:t>MCx</a:t>
+            </a:r>
+            <a:r>
+              <a:rPr lang="en-US" sz="1400" b="1" dirty="0"/>
+              <a:t> Extension</a:t>
+            </a:r>
+          </a:p>
+          <a:p>
+            <a:endParaRPr lang="en-US" sz="1200" dirty="0"/>
+          </a:p>
+          <a:p>
+            <a:r>
+              <a:rPr lang="en-US" sz="1200" dirty="0"/>
+              <a:t>All configuration of how </a:t>
+            </a:r>
+            <a:r>
+              <a:rPr lang="en-US" sz="1200" dirty="0" err="1"/>
+              <a:t>GigPerformer</a:t>
+            </a:r>
+            <a:r>
+              <a:rPr lang="en-US" sz="1200" dirty="0"/>
+              <a:t> interacts with the </a:t>
+            </a:r>
+            <a:r>
+              <a:rPr lang="en-US" sz="1200" dirty="0" err="1"/>
+              <a:t>MCx</a:t>
+            </a:r>
+            <a:r>
+              <a:rPr lang="en-US" sz="1200" dirty="0"/>
+              <a:t> is done through widgets in </a:t>
+            </a:r>
+            <a:r>
+              <a:rPr lang="en-US" sz="1200" dirty="0" err="1"/>
+              <a:t>GigPerformer</a:t>
             </a:r>
             <a:r>
               <a:rPr lang="en-US" sz="1200" dirty="0"/>
@@ -5685,260 +5899,43 @@
           <a:p>
             <a:r>
               <a:rPr lang="en-US" sz="1200" dirty="0"/>
-              <a:t>The name that will display for each widget on the controller is (by default) the widget’s caption</a:t>
-            </a:r>
-          </a:p>
-          <a:p>
-            <a:pPr marL="628650" lvl="1" indent="-171450">
-              <a:buFont typeface="Arial" panose="020B0604020202020204" pitchFamily="34" charset="0"/>
-              <a:buChar char="•"/>
-            </a:pPr>
-            <a:r>
-              <a:rPr lang="en-US" sz="1200" dirty="0"/>
-              <a:t>If you let the underlying plugin change the caption it may not sync properly with the controller display.  This is because </a:t>
-            </a:r>
-            <a:r>
-              <a:rPr lang="en-US" sz="1200" dirty="0" err="1"/>
-              <a:t>GigPerformer</a:t>
-            </a:r>
-            <a:r>
-              <a:rPr lang="en-US" sz="1200" dirty="0"/>
-              <a:t> runs audio and scripting in different threads, so we can’t know which will execute first</a:t>
-            </a:r>
-          </a:p>
-          <a:p>
-            <a:pPr marL="628650" lvl="1" indent="-171450">
-              <a:buFont typeface="Arial" panose="020B0604020202020204" pitchFamily="34" charset="0"/>
-              <a:buChar char="•"/>
-            </a:pPr>
-            <a:endParaRPr lang="en-US" sz="1200" dirty="0"/>
-          </a:p>
-          <a:p>
-            <a:r>
-              <a:rPr lang="en-US" sz="1200" dirty="0"/>
-              <a:t>For full control of what appears on the controller display when the widget is on and off you can use separate text widgets</a:t>
-            </a:r>
-          </a:p>
-          <a:p>
-            <a:pPr marL="628650" lvl="1" indent="-171450">
-              <a:buFont typeface="Arial" panose="020B0604020202020204" pitchFamily="34" charset="0"/>
-              <a:buChar char="•"/>
-            </a:pPr>
-            <a:r>
-              <a:rPr lang="en-US" sz="1200" dirty="0"/>
-              <a:t>The OSC/</a:t>
-            </a:r>
-            <a:r>
-              <a:rPr lang="en-US" sz="1200" dirty="0" err="1"/>
-              <a:t>GPScript</a:t>
-            </a:r>
-            <a:r>
-              <a:rPr lang="en-US" sz="1200" dirty="0"/>
-              <a:t> names for the text widgets parallel the button widgets but with a “p” added to the name</a:t>
-            </a:r>
-          </a:p>
-          <a:p>
-            <a:pPr marL="628650" lvl="1" indent="-171450">
-              <a:buFont typeface="Arial" panose="020B0604020202020204" pitchFamily="34" charset="0"/>
-              <a:buChar char="•"/>
-            </a:pPr>
-            <a:r>
-              <a:rPr lang="en-US" sz="1200" dirty="0"/>
-              <a:t>e.g., “mcx_bp_fx_0” will control the label for the bottom left switch</a:t>
-            </a:r>
-          </a:p>
-          <a:p>
-            <a:pPr marL="628650" lvl="1" indent="-171450">
-              <a:buFont typeface="Arial" panose="020B0604020202020204" pitchFamily="34" charset="0"/>
-              <a:buChar char="•"/>
-            </a:pPr>
-            <a:r>
-              <a:rPr lang="en-US" sz="1200" dirty="0"/>
-              <a:t>Use a Customized Caption in the format “</a:t>
-            </a:r>
-            <a:r>
-              <a:rPr lang="en-US" sz="1200" dirty="0" err="1"/>
-              <a:t>OffName_OnName_LongName</a:t>
-            </a:r>
-            <a:r>
-              <a:rPr lang="en-US" sz="1200" dirty="0"/>
-              <a:t>”</a:t>
-            </a:r>
-          </a:p>
-          <a:p>
-            <a:pPr marL="628650" lvl="1" indent="-171450">
-              <a:buFont typeface="Arial" panose="020B0604020202020204" pitchFamily="34" charset="0"/>
-              <a:buChar char="•"/>
-            </a:pPr>
-            <a:r>
-              <a:rPr lang="en-US" sz="1200" dirty="0"/>
-              <a:t>I generally hide these widgets by selecting the “Hide” option on the General tab of the text widget</a:t>
-            </a:r>
-          </a:p>
-          <a:p>
-            <a:endParaRPr lang="en-US" sz="1200" dirty="0"/>
-          </a:p>
-          <a:p>
-            <a:endParaRPr lang="en-US" sz="1200" dirty="0"/>
-          </a:p>
-          <a:p>
-            <a:endParaRPr lang="en-US" sz="1200" dirty="0"/>
-          </a:p>
-          <a:p>
-            <a:endParaRPr lang="en-US" sz="1200" dirty="0"/>
-          </a:p>
-          <a:p>
-            <a:endParaRPr lang="en-US" sz="1200" dirty="0"/>
-          </a:p>
-          <a:p>
-            <a:r>
-              <a:rPr lang="en-US" sz="1200" dirty="0"/>
-              <a:t>Assigning widgets to the top row is the same, except the first part of the name must be “</a:t>
-            </a:r>
-            <a:r>
-              <a:rPr lang="en-US" sz="1200" dirty="0" err="1"/>
-              <a:t>mcx_t</a:t>
-            </a:r>
-            <a:r>
-              <a:rPr lang="en-US" sz="1200" dirty="0"/>
-              <a:t>”.  (i.e., t=top, b=bottom)</a:t>
-            </a:r>
-          </a:p>
-          <a:p>
-            <a:pPr marL="628650" lvl="1" indent="-171450">
-              <a:buFont typeface="Arial" panose="020B0604020202020204" pitchFamily="34" charset="0"/>
-              <a:buChar char="•"/>
-            </a:pPr>
-            <a:r>
-              <a:rPr lang="en-US" sz="1200" dirty="0"/>
-              <a:t>If you didn’t change the “</a:t>
-            </a:r>
-            <a:r>
-              <a:rPr lang="en-US" sz="1200" dirty="0" err="1"/>
-              <a:t>mcx_initial_row_config</a:t>
-            </a:r>
-            <a:r>
-              <a:rPr lang="en-US" sz="1200" dirty="0"/>
-              <a:t>” widget then the top row will select variations by default</a:t>
-            </a:r>
-          </a:p>
-          <a:p>
-            <a:pPr marL="628650" lvl="1" indent="-171450">
-              <a:buFont typeface="Arial" panose="020B0604020202020204" pitchFamily="34" charset="0"/>
-              <a:buChar char="•"/>
-            </a:pPr>
-            <a:r>
-              <a:rPr lang="en-US" sz="1200" dirty="0"/>
-              <a:t>To change what is being displayed on the top row, long-press the second button on the top row to rotate between </a:t>
-            </a:r>
-            <a:r>
-              <a:rPr lang="en-US" sz="1200" dirty="0" err="1"/>
-              <a:t>Rackspaces</a:t>
-            </a:r>
-            <a:r>
-              <a:rPr lang="en-US" sz="1200" dirty="0"/>
-              <a:t>, Variations, and widgets</a:t>
-            </a:r>
-          </a:p>
-          <a:p>
-            <a:endParaRPr lang="en-US" sz="1200" dirty="0"/>
-          </a:p>
-        </p:txBody>
-      </p:sp>
-      <p:pic>
-        <p:nvPicPr>
-          <p:cNvPr id="6" name="Picture 5">
-            <a:extLst>
-              <a:ext uri="{FF2B5EF4-FFF2-40B4-BE49-F238E27FC236}">
-                <a16:creationId xmlns:a16="http://schemas.microsoft.com/office/drawing/2014/main" id="{61E1F877-344E-D008-E7DE-92A15EF98AAF}"/>
-              </a:ext>
-            </a:extLst>
-          </p:cNvPr>
-          <p:cNvPicPr>
-            <a:picLocks noChangeAspect="1"/>
-          </p:cNvPicPr>
-          <p:nvPr/>
-        </p:nvPicPr>
-        <p:blipFill>
-          <a:blip r:embed="rId2"/>
-          <a:stretch>
-            <a:fillRect/>
-          </a:stretch>
-        </p:blipFill>
-        <p:spPr>
-          <a:xfrm>
-            <a:off x="4985511" y="1194706"/>
-            <a:ext cx="2508443" cy="931048"/>
-          </a:xfrm>
-          <a:prstGeom prst="rect">
-            <a:avLst/>
-          </a:prstGeom>
-        </p:spPr>
-      </p:pic>
-      <p:pic>
-        <p:nvPicPr>
-          <p:cNvPr id="8" name="Picture 7">
-            <a:extLst>
-              <a:ext uri="{FF2B5EF4-FFF2-40B4-BE49-F238E27FC236}">
-                <a16:creationId xmlns:a16="http://schemas.microsoft.com/office/drawing/2014/main" id="{5B6F7644-77AC-834B-B474-2320EF69D988}"/>
-              </a:ext>
-            </a:extLst>
-          </p:cNvPr>
-          <p:cNvPicPr>
-            <a:picLocks noChangeAspect="1"/>
-          </p:cNvPicPr>
-          <p:nvPr/>
-        </p:nvPicPr>
-        <p:blipFill>
-          <a:blip r:embed="rId3"/>
-          <a:stretch>
-            <a:fillRect/>
-          </a:stretch>
-        </p:blipFill>
-        <p:spPr>
-          <a:xfrm>
-            <a:off x="1155033" y="4543595"/>
-            <a:ext cx="2469931" cy="690744"/>
-          </a:xfrm>
-          <a:prstGeom prst="rect">
-            <a:avLst/>
-          </a:prstGeom>
-        </p:spPr>
-      </p:pic>
-      <p:pic>
-        <p:nvPicPr>
-          <p:cNvPr id="10" name="Picture 9">
-            <a:extLst>
-              <a:ext uri="{FF2B5EF4-FFF2-40B4-BE49-F238E27FC236}">
-                <a16:creationId xmlns:a16="http://schemas.microsoft.com/office/drawing/2014/main" id="{EFEDBE70-3B1D-4AA8-5327-B8C80F389FEB}"/>
-              </a:ext>
-            </a:extLst>
-          </p:cNvPr>
-          <p:cNvPicPr>
-            <a:picLocks noChangeAspect="1"/>
-          </p:cNvPicPr>
-          <p:nvPr/>
-        </p:nvPicPr>
-        <p:blipFill>
-          <a:blip r:embed="rId4"/>
-          <a:stretch>
-            <a:fillRect/>
-          </a:stretch>
-        </p:blipFill>
-        <p:spPr>
-          <a:xfrm>
-            <a:off x="3941913" y="4543596"/>
-            <a:ext cx="3352661" cy="698706"/>
-          </a:xfrm>
-          <a:prstGeom prst="rect">
-            <a:avLst/>
-          </a:prstGeom>
-        </p:spPr>
-      </p:pic>
+              <a:t>This document is divided into two major parts:</a:t>
+            </a:r>
+          </a:p>
+          <a:p>
+            <a:pPr marL="171450" indent="-171450">
+              <a:buFont typeface="Arial" panose="020B0604020202020204" pitchFamily="34" charset="0"/>
+              <a:buChar char="•"/>
+            </a:pPr>
+            <a:r>
+              <a:rPr lang="en-US" sz="1200" dirty="0"/>
+              <a:t>Conceptual relationship between the physical displays and buttons on the </a:t>
+            </a:r>
+            <a:r>
+              <a:rPr lang="en-US" sz="1200" dirty="0" err="1"/>
+              <a:t>MCx</a:t>
+            </a:r>
+            <a:r>
+              <a:rPr lang="en-US" sz="1200" dirty="0"/>
+              <a:t> and the logical structure of the extension</a:t>
+            </a:r>
+          </a:p>
+          <a:p>
+            <a:pPr marL="171450" indent="-171450">
+              <a:buFont typeface="Arial" panose="020B0604020202020204" pitchFamily="34" charset="0"/>
+              <a:buChar char="•"/>
+            </a:pPr>
+            <a:r>
+              <a:rPr lang="en-US" sz="1200" dirty="0"/>
+              <a:t>Configuring widgets to produce the results you are looking for</a:t>
+            </a:r>
+          </a:p>
+        </p:txBody>
+      </p:sp>
     </p:spTree>
     <p:extLst>
       <p:ext uri="{BB962C8B-B14F-4D97-AF65-F5344CB8AC3E}">
-        <p14:creationId xmlns:p14="http://schemas.microsoft.com/office/powerpoint/2010/main" val="1585427807"/>
+        <p14:creationId xmlns:p14="http://schemas.microsoft.com/office/powerpoint/2010/main" val="472276715"/>
       </p:ext>
     </p:extLst>
   </p:cSld>
@@ -5974,7 +5971,7 @@
         <p:spPr>
           <a:xfrm>
             <a:off x="362992" y="369537"/>
-            <a:ext cx="8095208" cy="5878532"/>
+            <a:ext cx="8095208" cy="6032421"/>
           </a:xfrm>
           <a:prstGeom prst="rect">
             <a:avLst/>
@@ -5989,15 +5986,21 @@
           <a:p>
             <a:r>
               <a:rPr lang="en-US" sz="1400" b="1" dirty="0"/>
-              <a:t>Design Goal of the </a:t>
-            </a:r>
-            <a:r>
-              <a:rPr lang="en-US" sz="1400" b="1" dirty="0" err="1"/>
-              <a:t>MCx</a:t>
-            </a:r>
-            <a:r>
-              <a:rPr lang="en-US" sz="1400" b="1" dirty="0"/>
-              <a:t> Extension</a:t>
+              <a:t>Basic Toggle Controls</a:t>
+            </a:r>
+          </a:p>
+          <a:p>
+            <a:r>
+              <a:rPr lang="en-US" sz="1200" dirty="0"/>
+              <a:t>If you’re starting from a new Rackspace (i.e., not one from the demo </a:t>
+            </a:r>
+            <a:r>
+              <a:rPr lang="en-US" sz="1200" dirty="0" err="1"/>
+              <a:t>gigfile</a:t>
+            </a:r>
+            <a:r>
+              <a:rPr lang="en-US" sz="1200" dirty="0"/>
+              <a:t>) assigning button-type widgets to your footswitches is very simple.  All you have to do is edit the properties of the widget.</a:t>
             </a:r>
           </a:p>
           <a:p>
@@ -6006,7 +6009,103 @@
           <a:p>
             <a:r>
               <a:rPr lang="en-US" sz="1200" dirty="0"/>
-              <a:t>The goal for the extension was to make controlling </a:t>
+              <a:t>To assign widgets to the switches on the bottom row:</a:t>
+            </a:r>
+          </a:p>
+          <a:p>
+            <a:pPr marL="628650" lvl="1" indent="-171450">
+              <a:buFont typeface="Arial" panose="020B0604020202020204" pitchFamily="34" charset="0"/>
+              <a:buChar char="•"/>
+            </a:pPr>
+            <a:r>
+              <a:rPr lang="en-US" sz="1200" dirty="0"/>
+              <a:t>Edit the widget and select the “Advanced” tab</a:t>
+            </a:r>
+          </a:p>
+          <a:p>
+            <a:pPr marL="628650" lvl="1" indent="-171450">
+              <a:buFont typeface="Arial" panose="020B0604020202020204" pitchFamily="34" charset="0"/>
+              <a:buChar char="•"/>
+            </a:pPr>
+            <a:r>
+              <a:rPr lang="en-US" sz="1200" dirty="0"/>
+              <a:t>In the “OSC/</a:t>
+            </a:r>
+            <a:r>
+              <a:rPr lang="en-US" sz="1200" dirty="0" err="1"/>
+              <a:t>GPScript</a:t>
+            </a:r>
+            <a:r>
+              <a:rPr lang="en-US" sz="1200" dirty="0"/>
+              <a:t> Name” field type “mcx_b_fx_0”</a:t>
+            </a:r>
+          </a:p>
+          <a:p>
+            <a:pPr marL="628650" lvl="1" indent="-171450">
+              <a:buFont typeface="Arial" panose="020B0604020202020204" pitchFamily="34" charset="0"/>
+              <a:buChar char="•"/>
+            </a:pPr>
+            <a:r>
+              <a:rPr lang="en-US" sz="1200" dirty="0"/>
+              <a:t>This will assign the widget to the bottom left switch</a:t>
+            </a:r>
+          </a:p>
+          <a:p>
+            <a:pPr marL="628650" lvl="1" indent="-171450">
+              <a:buFont typeface="Arial" panose="020B0604020202020204" pitchFamily="34" charset="0"/>
+              <a:buChar char="•"/>
+            </a:pPr>
+            <a:r>
+              <a:rPr lang="en-US" sz="1200" dirty="0"/>
+              <a:t>Change the 0 to 1, 2, or 3 for the other bottom row switches</a:t>
+            </a:r>
+          </a:p>
+          <a:p>
+            <a:endParaRPr lang="en-US" sz="1200" dirty="0"/>
+          </a:p>
+          <a:p>
+            <a:r>
+              <a:rPr lang="en-US" sz="1200" b="1" i="1" dirty="0"/>
+              <a:t>To sync your Rackspace with the foot controller you must change </a:t>
+            </a:r>
+            <a:r>
+              <a:rPr lang="en-US" sz="1200" b="1" i="1" dirty="0" err="1"/>
+              <a:t>Rackspaces</a:t>
+            </a:r>
+            <a:r>
+              <a:rPr lang="en-US" sz="1200" b="1" i="1" dirty="0"/>
+              <a:t>, then come back</a:t>
+            </a:r>
+            <a:r>
+              <a:rPr lang="en-US" sz="1200" dirty="0"/>
+              <a:t>.  This is necessary because the extension scans widget names upon Rackspace entry.  It doesn’t know you renamed widgets until you change </a:t>
+            </a:r>
+            <a:r>
+              <a:rPr lang="en-US" sz="1200" dirty="0" err="1"/>
+              <a:t>Rackspaces</a:t>
+            </a:r>
+            <a:r>
+              <a:rPr lang="en-US" sz="1200" dirty="0"/>
+              <a:t>.</a:t>
+            </a:r>
+          </a:p>
+          <a:p>
+            <a:endParaRPr lang="en-US" sz="1200" dirty="0"/>
+          </a:p>
+          <a:p>
+            <a:r>
+              <a:rPr lang="en-US" sz="1200" dirty="0"/>
+              <a:t>The name that will display for each widget on the controller is (by default) the widget’s caption</a:t>
+            </a:r>
+          </a:p>
+          <a:p>
+            <a:pPr marL="628650" lvl="1" indent="-171450">
+              <a:buFont typeface="Arial" panose="020B0604020202020204" pitchFamily="34" charset="0"/>
+              <a:buChar char="•"/>
+            </a:pPr>
+            <a:r>
+              <a:rPr lang="en-US" sz="1200" dirty="0"/>
+              <a:t>If you let the underlying plugin change the caption it may not sync properly with the controller display.  This is because </a:t>
             </a:r>
             <a:r>
               <a:rPr lang="en-US" sz="1200" dirty="0" err="1"/>
@@ -6014,15 +6113,133 @@
             </a:r>
             <a:r>
               <a:rPr lang="en-US" sz="1200" dirty="0"/>
-              <a:t> with the MC8 simple, reliable, and flexible while keeping all configuration entirely within </a:t>
-            </a:r>
-            <a:r>
-              <a:rPr lang="en-US" sz="1200" dirty="0" err="1"/>
-              <a:t>GigPerformer</a:t>
-            </a:r>
-            <a:r>
-              <a:rPr lang="en-US" sz="1200" dirty="0"/>
-              <a:t>.  Specifically, to allow the MC8 to automatically stay in sync with any changes made in </a:t>
+              <a:t> runs audio and scripting in different threads, so we can’t know which will execute first</a:t>
+            </a:r>
+          </a:p>
+          <a:p>
+            <a:pPr marL="628650" lvl="1" indent="-171450">
+              <a:buFont typeface="Arial" panose="020B0604020202020204" pitchFamily="34" charset="0"/>
+              <a:buChar char="•"/>
+            </a:pPr>
+            <a:endParaRPr lang="en-US" sz="1200" dirty="0"/>
+          </a:p>
+          <a:p>
+            <a:r>
+              <a:rPr lang="en-US" sz="1200" dirty="0"/>
+              <a:t>For full control of what appears on the controller display when the widget is on and off you can use separate text widgets</a:t>
+            </a:r>
+          </a:p>
+          <a:p>
+            <a:pPr marL="628650" lvl="1" indent="-171450">
+              <a:buFont typeface="Arial" panose="020B0604020202020204" pitchFamily="34" charset="0"/>
+              <a:buChar char="•"/>
+            </a:pPr>
+            <a:r>
+              <a:rPr lang="en-US" sz="1200" dirty="0"/>
+              <a:t>The OSC/</a:t>
+            </a:r>
+            <a:r>
+              <a:rPr lang="en-US" sz="1200" dirty="0" err="1"/>
+              <a:t>GPScript</a:t>
+            </a:r>
+            <a:r>
+              <a:rPr lang="en-US" sz="1200" dirty="0"/>
+              <a:t> names for the text widgets parallel the button widgets but with a “p” added to the name</a:t>
+            </a:r>
+          </a:p>
+          <a:p>
+            <a:pPr marL="628650" lvl="1" indent="-171450">
+              <a:buFont typeface="Arial" panose="020B0604020202020204" pitchFamily="34" charset="0"/>
+              <a:buChar char="•"/>
+            </a:pPr>
+            <a:r>
+              <a:rPr lang="en-US" sz="1200" dirty="0"/>
+              <a:t>e.g., “mcx_bp_fx_0” will control the label for the bottom left switch</a:t>
+            </a:r>
+          </a:p>
+          <a:p>
+            <a:pPr marL="628650" lvl="1" indent="-171450">
+              <a:buFont typeface="Arial" panose="020B0604020202020204" pitchFamily="34" charset="0"/>
+              <a:buChar char="•"/>
+            </a:pPr>
+            <a:r>
+              <a:rPr lang="en-US" sz="1200" dirty="0"/>
+              <a:t>Use a Customized Caption in the format “</a:t>
+            </a:r>
+            <a:r>
+              <a:rPr lang="en-US" sz="1200" dirty="0" err="1"/>
+              <a:t>OffName_OnName_LongName</a:t>
+            </a:r>
+            <a:r>
+              <a:rPr lang="en-US" sz="1200" dirty="0"/>
+              <a:t>”</a:t>
+            </a:r>
+          </a:p>
+          <a:p>
+            <a:pPr marL="628650" lvl="1" indent="-171450">
+              <a:buFont typeface="Arial" panose="020B0604020202020204" pitchFamily="34" charset="0"/>
+              <a:buChar char="•"/>
+            </a:pPr>
+            <a:r>
+              <a:rPr lang="en-US" sz="1200" dirty="0"/>
+              <a:t>I generally hide these widgets by selecting the “Hide” option on the General tab of the text widget</a:t>
+            </a:r>
+          </a:p>
+          <a:p>
+            <a:endParaRPr lang="en-US" sz="1200" dirty="0"/>
+          </a:p>
+          <a:p>
+            <a:endParaRPr lang="en-US" sz="1200" dirty="0"/>
+          </a:p>
+          <a:p>
+            <a:endParaRPr lang="en-US" sz="1200" dirty="0"/>
+          </a:p>
+          <a:p>
+            <a:endParaRPr lang="en-US" sz="1200" dirty="0"/>
+          </a:p>
+          <a:p>
+            <a:endParaRPr lang="en-US" sz="1200" dirty="0"/>
+          </a:p>
+          <a:p>
+            <a:r>
+              <a:rPr lang="en-US" sz="1200" dirty="0"/>
+              <a:t>Assigning widgets to the top row is the same, except the first part of the name must be “</a:t>
+            </a:r>
+            <a:r>
+              <a:rPr lang="en-US" sz="1200" dirty="0" err="1"/>
+              <a:t>mcx_t</a:t>
+            </a:r>
+            <a:r>
+              <a:rPr lang="en-US" sz="1200" dirty="0"/>
+              <a:t>”.  (i.e., t=top, b=bottom)</a:t>
+            </a:r>
+          </a:p>
+          <a:p>
+            <a:pPr marL="628650" lvl="1" indent="-171450">
+              <a:buFont typeface="Arial" panose="020B0604020202020204" pitchFamily="34" charset="0"/>
+              <a:buChar char="•"/>
+            </a:pPr>
+            <a:r>
+              <a:rPr lang="en-US" sz="1200" dirty="0"/>
+              <a:t>If you didn’t change the “</a:t>
+            </a:r>
+            <a:r>
+              <a:rPr lang="en-US" sz="1200" dirty="0" err="1"/>
+              <a:t>mcx_initial_row_config</a:t>
+            </a:r>
+            <a:r>
+              <a:rPr lang="en-US" sz="1200" dirty="0"/>
+              <a:t>” widget then the top row will select variations by default</a:t>
+            </a:r>
+          </a:p>
+          <a:p>
+            <a:pPr marL="628650" lvl="1" indent="-171450">
+              <a:buFont typeface="Arial" panose="020B0604020202020204" pitchFamily="34" charset="0"/>
+              <a:buChar char="•"/>
+            </a:pPr>
+            <a:r>
+              <a:rPr lang="en-US" sz="1200" dirty="0"/>
+              <a:t>To change what is being displayed on the top row, long-press the second button on the top row to rotate between </a:t>
             </a:r>
             <a:r>
               <a:rPr lang="en-US" sz="1200" dirty="0" err="1"/>
@@ -6030,317 +6247,108 @@
             </a:r>
             <a:r>
               <a:rPr lang="en-US" sz="1200" dirty="0"/>
-              <a:t>, Variations, Songs, Setlists, etc.  It has been adapted to work with the MC6 and MC6 Pro.  Collectively we’ll refer to these as </a:t>
-            </a:r>
-            <a:r>
-              <a:rPr lang="en-US" sz="1200" dirty="0" err="1"/>
-              <a:t>MCx</a:t>
-            </a:r>
-            <a:r>
-              <a:rPr lang="en-US" sz="1200" dirty="0"/>
-              <a:t>.</a:t>
+              <a:t>, Variations, and widgets</a:t>
             </a:r>
           </a:p>
           <a:p>
             <a:endParaRPr lang="en-US" sz="1200" dirty="0"/>
           </a:p>
-          <a:p>
-            <a:r>
-              <a:rPr lang="en-US" sz="1200" dirty="0"/>
-              <a:t>This extension requires setting one bank on the </a:t>
-            </a:r>
-            <a:r>
-              <a:rPr lang="en-US" sz="1200" dirty="0" err="1"/>
-              <a:t>MCx</a:t>
-            </a:r>
-            <a:r>
-              <a:rPr lang="en-US" sz="1200" dirty="0"/>
-              <a:t> to communicate with this </a:t>
-            </a:r>
-            <a:r>
-              <a:rPr lang="en-US" sz="1200" dirty="0" err="1"/>
-              <a:t>GigPerformer</a:t>
-            </a:r>
-            <a:r>
-              <a:rPr lang="en-US" sz="1200" dirty="0"/>
-              <a:t> extension.  Any bank can be used for this purpose.  When controlling </a:t>
-            </a:r>
-            <a:r>
-              <a:rPr lang="en-US" sz="1200" dirty="0" err="1"/>
-              <a:t>GigPerformer</a:t>
-            </a:r>
-            <a:r>
-              <a:rPr lang="en-US" sz="1200" dirty="0"/>
-              <a:t> with this extension the </a:t>
-            </a:r>
-            <a:r>
-              <a:rPr lang="en-US" sz="1200" dirty="0" err="1"/>
-              <a:t>MCx</a:t>
-            </a:r>
-            <a:r>
-              <a:rPr lang="en-US" sz="1200" dirty="0"/>
-              <a:t> will always be operating with that single bank.  To minimize risk of unintentionally overwriting your other banks, your </a:t>
-            </a:r>
-            <a:r>
-              <a:rPr lang="en-US" sz="1200" dirty="0" err="1"/>
-              <a:t>MCx</a:t>
-            </a:r>
-            <a:r>
-              <a:rPr lang="en-US" sz="1200" dirty="0"/>
-              <a:t> should be set to this </a:t>
-            </a:r>
-            <a:r>
-              <a:rPr lang="en-US" sz="1200" dirty="0" err="1"/>
-              <a:t>GigPerformer</a:t>
-            </a:r>
-            <a:r>
-              <a:rPr lang="en-US" sz="1200" dirty="0"/>
-              <a:t> bank before starting </a:t>
-            </a:r>
-            <a:r>
-              <a:rPr lang="en-US" sz="1200" dirty="0" err="1"/>
-              <a:t>GigPerformer</a:t>
-            </a:r>
-            <a:r>
-              <a:rPr lang="en-US" sz="1200" dirty="0"/>
-              <a:t> using this extension.</a:t>
-            </a:r>
-          </a:p>
-          <a:p>
-            <a:endParaRPr lang="en-US" sz="1200" dirty="0"/>
-          </a:p>
-          <a:p>
-            <a:r>
-              <a:rPr lang="en-US" sz="1200" dirty="0"/>
-              <a:t>With this GP bank the user will be able to assign any number of toggle widgets to </a:t>
-            </a:r>
-            <a:r>
-              <a:rPr lang="en-US" sz="1200" dirty="0" err="1"/>
-              <a:t>MCx</a:t>
-            </a:r>
-            <a:r>
-              <a:rPr lang="en-US" sz="1200" dirty="0"/>
-              <a:t> foot switches, switch among </a:t>
-            </a:r>
-            <a:r>
-              <a:rPr lang="en-US" sz="1200" dirty="0" err="1"/>
-              <a:t>Rackspaces</a:t>
-            </a:r>
-            <a:r>
-              <a:rPr lang="en-US" sz="1200" dirty="0"/>
-              <a:t> and Variations, or Songs and </a:t>
-            </a:r>
-            <a:r>
-              <a:rPr lang="en-US" sz="1200" dirty="0" err="1"/>
-              <a:t>Songparts</a:t>
-            </a:r>
-            <a:r>
-              <a:rPr lang="en-US" sz="1200" dirty="0"/>
-              <a:t>, and the </a:t>
-            </a:r>
-            <a:r>
-              <a:rPr lang="en-US" sz="1200" dirty="0" err="1"/>
-              <a:t>MCx</a:t>
-            </a:r>
-            <a:r>
-              <a:rPr lang="en-US" sz="1200" dirty="0"/>
-              <a:t> display will stay in sync to show which button is controlling what and what its present state is.</a:t>
-            </a:r>
-          </a:p>
-          <a:p>
-            <a:endParaRPr lang="en-US" sz="1200" dirty="0"/>
-          </a:p>
-          <a:p>
-            <a:r>
-              <a:rPr lang="en-US" sz="1200" dirty="0"/>
-              <a:t>This extension utilizes the </a:t>
-            </a:r>
-            <a:r>
-              <a:rPr lang="en-US" sz="1200" dirty="0" err="1"/>
-              <a:t>MCx</a:t>
-            </a:r>
-            <a:r>
-              <a:rPr lang="en-US" sz="1200" dirty="0"/>
-              <a:t> as a simple button and display device.   The </a:t>
-            </a:r>
-            <a:r>
-              <a:rPr lang="en-US" sz="1200" dirty="0" err="1"/>
-              <a:t>MCx</a:t>
-            </a:r>
-            <a:r>
-              <a:rPr lang="en-US" sz="1200" dirty="0"/>
-              <a:t> will display what the extension tells it to display, and the </a:t>
-            </a:r>
-            <a:r>
-              <a:rPr lang="en-US" sz="1200" dirty="0" err="1"/>
-              <a:t>MCx</a:t>
-            </a:r>
-            <a:r>
-              <a:rPr lang="en-US" sz="1200" dirty="0"/>
-              <a:t> will send the same messages whenever a </a:t>
-            </a:r>
-            <a:r>
-              <a:rPr lang="en-US" sz="1200" dirty="0" err="1"/>
-              <a:t>apecific</a:t>
-            </a:r>
-            <a:r>
-              <a:rPr lang="en-US" sz="1200" dirty="0"/>
-              <a:t> button is pressed.  All of the logic for controlling the displays and reacting to foot presses resides in the extension, not in the </a:t>
-            </a:r>
-            <a:r>
-              <a:rPr lang="en-US" sz="1200" dirty="0" err="1"/>
-              <a:t>MCx</a:t>
-            </a:r>
-            <a:r>
-              <a:rPr lang="en-US" sz="1200" dirty="0"/>
-              <a:t>.  The bank on the </a:t>
-            </a:r>
-            <a:r>
-              <a:rPr lang="en-US" sz="1200" dirty="0" err="1"/>
-              <a:t>MCx</a:t>
-            </a:r>
-            <a:r>
-              <a:rPr lang="en-US" sz="1200" dirty="0"/>
-              <a:t> that is used to control </a:t>
-            </a:r>
-            <a:r>
-              <a:rPr lang="en-US" sz="1200" dirty="0" err="1"/>
-              <a:t>GigPerformer</a:t>
-            </a:r>
-            <a:r>
-              <a:rPr lang="en-US" sz="1200" dirty="0"/>
-              <a:t> will never change, no matter how many racks, songs, variations, or widgets you choose to control with it.</a:t>
-            </a:r>
-          </a:p>
-          <a:p>
-            <a:endParaRPr lang="en-US" sz="1200" dirty="0"/>
-          </a:p>
-          <a:p>
-            <a:r>
-              <a:rPr lang="en-US" sz="1200" dirty="0"/>
-              <a:t>This means you can dedicate one “bank” on the </a:t>
-            </a:r>
-            <a:r>
-              <a:rPr lang="en-US" sz="1200" dirty="0" err="1"/>
-              <a:t>MCx</a:t>
-            </a:r>
-            <a:r>
-              <a:rPr lang="en-US" sz="1200" dirty="0"/>
-              <a:t> to </a:t>
-            </a:r>
-            <a:r>
-              <a:rPr lang="en-US" sz="1200" dirty="0" err="1"/>
-              <a:t>GigPerformer</a:t>
-            </a:r>
-            <a:r>
-              <a:rPr lang="en-US" sz="1200" dirty="0"/>
-              <a:t> and continue to use all other banks as you see fit.</a:t>
-            </a:r>
-          </a:p>
-          <a:p>
-            <a:endParaRPr lang="en-US" sz="1200" b="1" dirty="0"/>
-          </a:p>
-          <a:p>
-            <a:endParaRPr lang="en-US" sz="1200" b="1" dirty="0"/>
-          </a:p>
-          <a:p>
-            <a:r>
-              <a:rPr lang="en-US" sz="1400" b="1" dirty="0"/>
-              <a:t>Controlling </a:t>
-            </a:r>
-            <a:r>
-              <a:rPr lang="en-US" sz="1400" b="1" dirty="0" err="1"/>
-              <a:t>GigPerformer</a:t>
-            </a:r>
-            <a:r>
-              <a:rPr lang="en-US" sz="1400" b="1" dirty="0"/>
-              <a:t> with the </a:t>
-            </a:r>
-            <a:r>
-              <a:rPr lang="en-US" sz="1400" b="1" dirty="0" err="1"/>
-              <a:t>MCx</a:t>
-            </a:r>
-            <a:r>
-              <a:rPr lang="en-US" sz="1400" b="1" dirty="0"/>
-              <a:t> Extension</a:t>
-            </a:r>
-          </a:p>
-          <a:p>
-            <a:endParaRPr lang="en-US" sz="1200" dirty="0"/>
-          </a:p>
-          <a:p>
-            <a:r>
-              <a:rPr lang="en-US" sz="1200" dirty="0"/>
-              <a:t>All configuration of how </a:t>
-            </a:r>
-            <a:r>
-              <a:rPr lang="en-US" sz="1200" dirty="0" err="1"/>
-              <a:t>GigPerformer</a:t>
-            </a:r>
-            <a:r>
-              <a:rPr lang="en-US" sz="1200" dirty="0"/>
-              <a:t> interacts with the </a:t>
-            </a:r>
-            <a:r>
-              <a:rPr lang="en-US" sz="1200" dirty="0" err="1"/>
-              <a:t>MCx</a:t>
-            </a:r>
-            <a:r>
-              <a:rPr lang="en-US" sz="1200" dirty="0"/>
-              <a:t> is done through widgets in </a:t>
-            </a:r>
-            <a:r>
-              <a:rPr lang="en-US" sz="1200" dirty="0" err="1"/>
-              <a:t>GigPerformer</a:t>
-            </a:r>
-            <a:r>
-              <a:rPr lang="en-US" sz="1200" dirty="0"/>
-              <a:t>.</a:t>
-            </a:r>
-          </a:p>
-          <a:p>
-            <a:endParaRPr lang="en-US" sz="1200" dirty="0"/>
-          </a:p>
-          <a:p>
-            <a:r>
-              <a:rPr lang="en-US" sz="1200" dirty="0"/>
-              <a:t>This document is divided into two major parts:</a:t>
-            </a:r>
-          </a:p>
-          <a:p>
-            <a:pPr marL="171450" indent="-171450">
-              <a:buFont typeface="Arial" panose="020B0604020202020204" pitchFamily="34" charset="0"/>
-              <a:buChar char="•"/>
-            </a:pPr>
-            <a:r>
-              <a:rPr lang="en-US" sz="1200" dirty="0"/>
-              <a:t>Conceptual relationship between the physical displays and buttons on the </a:t>
-            </a:r>
-            <a:r>
-              <a:rPr lang="en-US" sz="1200" dirty="0" err="1"/>
-              <a:t>MCx</a:t>
-            </a:r>
-            <a:r>
-              <a:rPr lang="en-US" sz="1200" dirty="0"/>
-              <a:t> and the logical structure of the extension</a:t>
-            </a:r>
-          </a:p>
-          <a:p>
-            <a:pPr marL="171450" indent="-171450">
-              <a:buFont typeface="Arial" panose="020B0604020202020204" pitchFamily="34" charset="0"/>
-              <a:buChar char="•"/>
-            </a:pPr>
-            <a:r>
-              <a:rPr lang="en-US" sz="1200" dirty="0"/>
-              <a:t>Configuring widgets to produce the results you are looking for</a:t>
-            </a:r>
-          </a:p>
-        </p:txBody>
-      </p:sp>
+        </p:txBody>
+      </p:sp>
+      <p:pic>
+        <p:nvPicPr>
+          <p:cNvPr id="6" name="Picture 5">
+            <a:extLst>
+              <a:ext uri="{FF2B5EF4-FFF2-40B4-BE49-F238E27FC236}">
+                <a16:creationId xmlns:a16="http://schemas.microsoft.com/office/drawing/2014/main" id="{61E1F877-344E-D008-E7DE-92A15EF98AAF}"/>
+              </a:ext>
+            </a:extLst>
+          </p:cNvPr>
+          <p:cNvPicPr>
+            <a:picLocks noChangeAspect="1"/>
+          </p:cNvPicPr>
+          <p:nvPr/>
+        </p:nvPicPr>
+        <p:blipFill>
+          <a:blip r:embed="rId2"/>
+          <a:stretch>
+            <a:fillRect/>
+          </a:stretch>
+        </p:blipFill>
+        <p:spPr>
+          <a:xfrm>
+            <a:off x="4985511" y="1194706"/>
+            <a:ext cx="2508443" cy="931048"/>
+          </a:xfrm>
+          <a:prstGeom prst="rect">
+            <a:avLst/>
+          </a:prstGeom>
+        </p:spPr>
+      </p:pic>
+      <p:pic>
+        <p:nvPicPr>
+          <p:cNvPr id="8" name="Picture 7">
+            <a:extLst>
+              <a:ext uri="{FF2B5EF4-FFF2-40B4-BE49-F238E27FC236}">
+                <a16:creationId xmlns:a16="http://schemas.microsoft.com/office/drawing/2014/main" id="{5B6F7644-77AC-834B-B474-2320EF69D988}"/>
+              </a:ext>
+            </a:extLst>
+          </p:cNvPr>
+          <p:cNvPicPr>
+            <a:picLocks noChangeAspect="1"/>
+          </p:cNvPicPr>
+          <p:nvPr/>
+        </p:nvPicPr>
+        <p:blipFill>
+          <a:blip r:embed="rId3"/>
+          <a:stretch>
+            <a:fillRect/>
+          </a:stretch>
+        </p:blipFill>
+        <p:spPr>
+          <a:xfrm>
+            <a:off x="1155033" y="4543595"/>
+            <a:ext cx="2469931" cy="690744"/>
+          </a:xfrm>
+          <a:prstGeom prst="rect">
+            <a:avLst/>
+          </a:prstGeom>
+        </p:spPr>
+      </p:pic>
+      <p:pic>
+        <p:nvPicPr>
+          <p:cNvPr id="10" name="Picture 9">
+            <a:extLst>
+              <a:ext uri="{FF2B5EF4-FFF2-40B4-BE49-F238E27FC236}">
+                <a16:creationId xmlns:a16="http://schemas.microsoft.com/office/drawing/2014/main" id="{EFEDBE70-3B1D-4AA8-5327-B8C80F389FEB}"/>
+              </a:ext>
+            </a:extLst>
+          </p:cNvPr>
+          <p:cNvPicPr>
+            <a:picLocks noChangeAspect="1"/>
+          </p:cNvPicPr>
+          <p:nvPr/>
+        </p:nvPicPr>
+        <p:blipFill>
+          <a:blip r:embed="rId4"/>
+          <a:stretch>
+            <a:fillRect/>
+          </a:stretch>
+        </p:blipFill>
+        <p:spPr>
+          <a:xfrm>
+            <a:off x="3941913" y="4543596"/>
+            <a:ext cx="3352661" cy="698706"/>
+          </a:xfrm>
+          <a:prstGeom prst="rect">
+            <a:avLst/>
+          </a:prstGeom>
+        </p:spPr>
+      </p:pic>
     </p:spTree>
     <p:extLst>
       <p:ext uri="{BB962C8B-B14F-4D97-AF65-F5344CB8AC3E}">
-        <p14:creationId xmlns:p14="http://schemas.microsoft.com/office/powerpoint/2010/main" val="472276715"/>
+        <p14:creationId xmlns:p14="http://schemas.microsoft.com/office/powerpoint/2010/main" val="1585427807"/>
       </p:ext>
     </p:extLst>
   </p:cSld>

</xml_diff>